<commit_message>
COMP270: Updating week 1 & 2 material (including workshop exercises); starting on week 3.
</commit_message>
<xml_diff>
--- a/COMP270/02/2020-21-COMP270-02-lecture-materials-1.pptx
+++ b/COMP270/02/2020-21-COMP270-02-lecture-materials-1.pptx
@@ -226,7 +226,7 @@
           <a:p>
             <a:fld id="{8906F081-8781-4431-8FD4-2CF608CD7C47}" type="datetimeFigureOut">
               <a:rPr lang="en-US" smtClean="0"/>
-              <a:t>8/4/2020</a:t>
+              <a:t>8/28/2020</a:t>
             </a:fld>
             <a:endParaRPr lang="en-US"/>
           </a:p>
@@ -391,7 +391,7 @@
           <a:p>
             <a:fld id="{F06CA47C-B7FD-4BE9-B0E6-81BA758D95F2}" type="datetimeFigureOut">
               <a:rPr lang="en-US" smtClean="0"/>
-              <a:t>8/4/2020</a:t>
+              <a:t>8/28/2020</a:t>
             </a:fld>
             <a:endParaRPr lang="en-US"/>
           </a:p>
@@ -786,22 +786,7 @@
           <a:bodyPr/>
           <a:lstStyle/>
           <a:p>
-            <a:r>
-              <a:rPr lang="en-GB" dirty="0"/>
-              <a:t>I said earlier that triangles could help us find information about lines and the points along them, so here is how: </a:t>
-            </a:r>
-          </a:p>
-          <a:p>
-            <a:r>
-              <a:rPr lang="en-GB" dirty="0"/>
-              <a:t>Here’s our line from earlier. Now, if the points on it are coordinates, that mean’s they’re specified relative to a set of axes. You may notice that we can now see one of our new friends: a right-angled triangle, that’s formed with the axes. We can make a more useful triangle if we consider the lines parallel to the axes that intersect the points.</a:t>
-            </a:r>
-          </a:p>
-          <a:p>
-            <a:r>
-              <a:rPr lang="en-GB" dirty="0"/>
-              <a:t>The lengths of its horizontal and vertical sides are given by the point coordinates</a:t>
-            </a:r>
+            <a:endParaRPr lang="en-GB" dirty="0"/>
           </a:p>
         </p:txBody>
       </p:sp>
@@ -887,18 +872,6 @@
           <a:p>
             <a:endParaRPr lang="en-GB" dirty="0"/>
           </a:p>
-          <a:p>
-            <a:endParaRPr lang="en-GB" dirty="0"/>
-          </a:p>
-          <a:p>
-            <a:r>
-              <a:rPr lang="en-GB" dirty="0"/>
-              <a:t>What if our points were the other way around?</a:t>
-            </a:r>
-          </a:p>
-          <a:p>
-            <a:endParaRPr lang="en-GB" dirty="0"/>
-          </a:p>
         </p:txBody>
       </p:sp>
       <p:sp>
@@ -981,16 +954,7 @@
           <a:bodyPr/>
           <a:lstStyle/>
           <a:p>
-            <a:r>
-              <a:rPr lang="en-GB" dirty="0"/>
-              <a:t>So, for these calculations, it doesn’t matter which order our points are in. But does it ever matter?</a:t>
-            </a:r>
-          </a:p>
-          <a:p>
-            <a:r>
-              <a:rPr lang="en-GB" dirty="0"/>
-              <a:t>The answer is yes, if we’re talking about vectors, which is the subject of the next video.</a:t>
-            </a:r>
+            <a:endParaRPr lang="en-GB" dirty="0"/>
           </a:p>
         </p:txBody>
       </p:sp>
@@ -1074,42 +1038,7 @@
           <a:bodyPr/>
           <a:lstStyle/>
           <a:p>
-            <a:r>
-              <a:rPr lang="en-GB" sz="800" dirty="0"/>
-              <a:t>Not </a:t>
-            </a:r>
-            <a:r>
-              <a:rPr lang="en-GB" sz="800" i="1" dirty="0"/>
-              <a:t>the</a:t>
-            </a:r>
-            <a:r>
-              <a:rPr lang="en-GB" sz="800" i="0" dirty="0"/>
-              <a:t> point, that’s a bigger philosophical question; we’re just talking about a geometric definition here.</a:t>
-            </a:r>
-          </a:p>
-          <a:p>
-            <a:endParaRPr lang="en-GB" sz="800" i="0" dirty="0"/>
-          </a:p>
-          <a:p>
-            <a:r>
-              <a:rPr lang="en-GB" sz="800" i="0" dirty="0"/>
-              <a:t>If we imagine this is our 1D space,</a:t>
-            </a:r>
-          </a:p>
-          <a:p>
-            <a:r>
-              <a:rPr lang="en-GB" sz="800" i="0" dirty="0"/>
-              <a:t>We can represent P using a distance from some defined origin point in the dimension, and that distance is P’s coordinate.</a:t>
-            </a:r>
-          </a:p>
-          <a:p>
-            <a:endParaRPr lang="en-GB" sz="800" i="0" dirty="0"/>
-          </a:p>
-          <a:p>
-            <a:r>
-              <a:rPr lang="en-GB" sz="800" i="0" dirty="0"/>
-              <a:t>We can’t really do a lot with 1D space, in terms of graphics at least, so we usually have at least 2 dimensions,</a:t>
-            </a:r>
+            <a:endParaRPr lang="en-GB" dirty="0"/>
           </a:p>
         </p:txBody>
       </p:sp>
@@ -1193,17 +1122,7 @@
           <a:bodyPr/>
           <a:lstStyle/>
           <a:p>
-            <a:r>
-              <a:rPr lang="en-GB" dirty="0"/>
-              <a:t>Which give us our familiar x and y coordinate axes. Note that in maths, we usually have the positive x-axis points to the right and positive y points up</a:t>
-            </a:r>
-            <a:br>
-              <a:rPr lang="en-GB" dirty="0"/>
-            </a:br>
-            <a:r>
-              <a:rPr lang="en-GB" dirty="0"/>
-              <a:t>Now we have a bit more space to play with, we can add some more types of objects…</a:t>
-            </a:r>
+            <a:endParaRPr lang="en-GB" dirty="0"/>
           </a:p>
         </p:txBody>
       </p:sp>
@@ -1287,16 +1206,7 @@
           <a:bodyPr/>
           <a:lstStyle/>
           <a:p>
-            <a:r>
-              <a:rPr lang="en-GB" dirty="0"/>
-              <a:t>… the next most obvious one being a line, which is …</a:t>
-            </a:r>
-          </a:p>
-          <a:p>
-            <a:r>
-              <a:rPr lang="en-GB" dirty="0"/>
-              <a:t>This line also gives us the shortest distance between the two points, but before we can find out what that is, we need to consider another object, with one more dimension than the line…</a:t>
-            </a:r>
+            <a:endParaRPr lang="en-GB" dirty="0"/>
           </a:p>
         </p:txBody>
       </p:sp>
@@ -1464,10 +1374,7 @@
           <a:bodyPr/>
           <a:lstStyle/>
           <a:p>
-            <a:r>
-              <a:rPr lang="en-GB" dirty="0"/>
-              <a:t>So that’s established a relationship between the sides; what about the angles?</a:t>
-            </a:r>
+            <a:endParaRPr lang="en-GB" dirty="0"/>
           </a:p>
         </p:txBody>
       </p:sp>
@@ -1551,10 +1458,7 @@
           <a:bodyPr/>
           <a:lstStyle/>
           <a:p>
-            <a:r>
-              <a:rPr lang="en-GB" dirty="0"/>
-              <a:t>Invent a better way to remember?!</a:t>
-            </a:r>
+            <a:endParaRPr lang="en-GB" dirty="0"/>
           </a:p>
         </p:txBody>
       </p:sp>
@@ -1638,18 +1542,7 @@
           <a:bodyPr/>
           <a:lstStyle/>
           <a:p>
-            <a:r>
-              <a:rPr lang="en-GB" dirty="0"/>
-              <a:t>These may seem like arbitrary formulae, but there are reasons why these relationships exist; have a look at the resources under the link to this presentation on </a:t>
-            </a:r>
-            <a:r>
-              <a:rPr lang="en-GB" dirty="0" err="1"/>
-              <a:t>LearningSpace</a:t>
-            </a:r>
-            <a:r>
-              <a:rPr lang="en-GB" dirty="0"/>
-              <a:t> for a visual explanation.</a:t>
-            </a:r>
+            <a:endParaRPr lang="en-GB" dirty="0"/>
           </a:p>
         </p:txBody>
       </p:sp>
@@ -1733,10 +1626,7 @@
           <a:bodyPr/>
           <a:lstStyle/>
           <a:p>
-            <a:r>
-              <a:rPr lang="en-GB" dirty="0"/>
-              <a:t>We have the formulae for some trigonometric function of the angle, but to find the angle itself, we need to take the inverse of that function…</a:t>
-            </a:r>
+            <a:endParaRPr lang="en-GB" dirty="0"/>
           </a:p>
         </p:txBody>
       </p:sp>
@@ -1936,7 +1826,7 @@
           <a:p>
             <a:fld id="{33024136-D290-48F3-A182-4C46BEB5146B}" type="datetime1">
               <a:rPr lang="en-US" smtClean="0"/>
-              <a:t>8/4/2020</a:t>
+              <a:t>8/28/2020</a:t>
             </a:fld>
             <a:endParaRPr lang="en-US" dirty="0"/>
           </a:p>
@@ -2120,7 +2010,7 @@
           <a:p>
             <a:fld id="{9CC7D44C-38B1-4D0F-9006-D5774F331095}" type="datetime1">
               <a:rPr lang="en-US" smtClean="0"/>
-              <a:t>8/4/2020</a:t>
+              <a:t>8/28/2020</a:t>
             </a:fld>
             <a:endParaRPr lang="en-US"/>
           </a:p>
@@ -2314,7 +2204,7 @@
           <a:p>
             <a:fld id="{F98D518A-FD4F-4358-B95B-9DB5A17160FB}" type="datetime1">
               <a:rPr lang="en-US" smtClean="0"/>
-              <a:t>8/4/2020</a:t>
+              <a:t>8/28/2020</a:t>
             </a:fld>
             <a:endParaRPr lang="en-US"/>
           </a:p>
@@ -2507,7 +2397,7 @@
           <a:p>
             <a:fld id="{5E2A9F4F-03AD-4497-A65D-076601BD41D2}" type="datetime1">
               <a:rPr lang="en-US" smtClean="0"/>
-              <a:t>8/4/2020</a:t>
+              <a:t>8/28/2020</a:t>
             </a:fld>
             <a:endParaRPr lang="en-US"/>
           </a:p>
@@ -2730,7 +2620,7 @@
           <a:p>
             <a:fld id="{EDFBF3AC-A781-43AA-8BD5-B12F49168B94}" type="datetime1">
               <a:rPr lang="en-US" smtClean="0"/>
-              <a:t>8/4/2020</a:t>
+              <a:t>8/28/2020</a:t>
             </a:fld>
             <a:endParaRPr lang="en-US"/>
           </a:p>
@@ -3015,7 +2905,7 @@
           <a:p>
             <a:fld id="{C5256A41-C91B-43FF-9881-F5DA9878418F}" type="datetime1">
               <a:rPr lang="en-US" smtClean="0"/>
-              <a:t>8/4/2020</a:t>
+              <a:t>8/28/2020</a:t>
             </a:fld>
             <a:endParaRPr lang="en-US"/>
           </a:p>
@@ -3418,7 +3308,7 @@
           <a:p>
             <a:fld id="{FFD7AA76-41EE-4C13-950E-E611B8B8FC52}" type="datetime1">
               <a:rPr lang="en-US" smtClean="0"/>
-              <a:t>8/4/2020</a:t>
+              <a:t>8/28/2020</a:t>
             </a:fld>
             <a:endParaRPr lang="en-US"/>
           </a:p>
@@ -3565,7 +3455,7 @@
           <a:p>
             <a:fld id="{89407A26-E7BC-4498-97E4-87AF12377CA9}" type="datetime1">
               <a:rPr lang="en-US" smtClean="0"/>
-              <a:t>8/4/2020</a:t>
+              <a:t>8/28/2020</a:t>
             </a:fld>
             <a:endParaRPr lang="en-US"/>
           </a:p>
@@ -3680,7 +3570,7 @@
           <a:p>
             <a:fld id="{93EA4171-1117-4486-993C-35A7470D8847}" type="datetime1">
               <a:rPr lang="en-US" smtClean="0"/>
-              <a:t>8/4/2020</a:t>
+              <a:t>8/28/2020</a:t>
             </a:fld>
             <a:endParaRPr lang="en-US"/>
           </a:p>
@@ -3952,7 +3842,7 @@
           <a:p>
             <a:fld id="{472A4CB8-1563-4663-81DB-74EB416C19BE}" type="datetime1">
               <a:rPr lang="en-US" smtClean="0"/>
-              <a:t>8/4/2020</a:t>
+              <a:t>8/28/2020</a:t>
             </a:fld>
             <a:endParaRPr lang="en-US"/>
           </a:p>
@@ -4288,7 +4178,7 @@
           <a:p>
             <a:fld id="{0C6724CE-2468-448B-87C1-A92EDD78369B}" type="datetime1">
               <a:rPr lang="en-US" smtClean="0"/>
-              <a:t>8/4/2020</a:t>
+              <a:t>8/28/2020</a:t>
             </a:fld>
             <a:endParaRPr lang="en-US"/>
           </a:p>
@@ -4549,7 +4439,7 @@
           <a:p>
             <a:fld id="{4CD11720-76E7-46E6-B0AA-057287C42052}" type="datetime1">
               <a:rPr lang="en-US" smtClean="0"/>
-              <a:t>8/4/2020</a:t>
+              <a:t>8/28/2020</a:t>
             </a:fld>
             <a:endParaRPr lang="en-US" dirty="0"/>
           </a:p>
@@ -5003,12 +4893,12 @@
   </p:clrMapOvr>
   <mc:AlternateContent xmlns:mc="http://schemas.openxmlformats.org/markup-compatibility/2006" xmlns:p14="http://schemas.microsoft.com/office/powerpoint/2010/main">
     <mc:Choice Requires="p14">
-      <p:transition spd="med" p14:dur="700">
+      <p:transition spd="med" p14:dur="700" advTm="15783">
         <p:fade/>
       </p:transition>
     </mc:Choice>
     <mc:Fallback xmlns="">
-      <p:transition spd="med">
+      <p:transition spd="med" advTm="15783">
         <p:fade/>
       </p:transition>
     </mc:Fallback>
@@ -5295,7 +5185,7 @@
                 </a:r>
                 <a:r>
                   <a:rPr lang="en-GB" b="1" dirty="0" err="1">
-                    <a:hlinkClick r:id="rId3"/>
+                    <a:hlinkClick r:id="rId4"/>
                   </a:rPr>
                   <a:t>arcsin</a:t>
                 </a:r>
@@ -5305,7 +5195,7 @@
                 </a:r>
                 <a:r>
                   <a:rPr lang="en-GB" b="1" dirty="0" err="1">
-                    <a:hlinkClick r:id="rId4"/>
+                    <a:hlinkClick r:id="rId5"/>
                   </a:rPr>
                   <a:t>arccos</a:t>
                 </a:r>
@@ -5315,7 +5205,7 @@
                 </a:r>
                 <a:r>
                   <a:rPr lang="en-GB" b="1" dirty="0">
-                    <a:hlinkClick r:id="rId5"/>
+                    <a:hlinkClick r:id="rId6"/>
                   </a:rPr>
                   <a:t>arctan</a:t>
                 </a:r>
@@ -5329,33 +5219,9 @@
                 <a:r>
                   <a:rPr lang="en-GB" b="1" dirty="0" err="1">
                     <a:latin typeface="Consolas" panose="020B0609020204030204" pitchFamily="49" charset="0"/>
-                    <a:hlinkClick r:id="rId6"/>
+                    <a:hlinkClick r:id="rId7"/>
                   </a:rPr>
                   <a:t>asin</a:t>
-                </a:r>
-                <a:r>
-                  <a:rPr lang="en-GB" b="1" dirty="0">
-                    <a:latin typeface="Consolas" panose="020B0609020204030204" pitchFamily="49" charset="0"/>
-                    <a:hlinkClick r:id="rId6"/>
-                  </a:rPr>
-                  <a:t>()</a:t>
-                </a:r>
-                <a:r>
-                  <a:rPr lang="en-GB" dirty="0">
-                    <a:latin typeface="Consolas" panose="020B0609020204030204" pitchFamily="49" charset="0"/>
-                  </a:rPr>
-                  <a:t> </a:t>
-                </a:r>
-                <a:r>
-                  <a:rPr lang="en-GB" dirty="0"/>
-                  <a:t>/ </a:t>
-                </a:r>
-                <a:r>
-                  <a:rPr lang="en-GB" b="1" dirty="0" err="1">
-                    <a:latin typeface="Consolas" panose="020B0609020204030204" pitchFamily="49" charset="0"/>
-                    <a:hlinkClick r:id="rId7"/>
-                  </a:rPr>
-                  <a:t>acos</a:t>
                 </a:r>
                 <a:r>
                   <a:rPr lang="en-GB" b="1" dirty="0">
@@ -5379,12 +5245,36 @@
                     <a:latin typeface="Consolas" panose="020B0609020204030204" pitchFamily="49" charset="0"/>
                     <a:hlinkClick r:id="rId8"/>
                   </a:rPr>
+                  <a:t>acos</a:t>
+                </a:r>
+                <a:r>
+                  <a:rPr lang="en-GB" b="1" dirty="0">
+                    <a:latin typeface="Consolas" panose="020B0609020204030204" pitchFamily="49" charset="0"/>
+                    <a:hlinkClick r:id="rId8"/>
+                  </a:rPr>
+                  <a:t>()</a:t>
+                </a:r>
+                <a:r>
+                  <a:rPr lang="en-GB" dirty="0">
+                    <a:latin typeface="Consolas" panose="020B0609020204030204" pitchFamily="49" charset="0"/>
+                  </a:rPr>
+                  <a:t> </a:t>
+                </a:r>
+                <a:r>
+                  <a:rPr lang="en-GB" dirty="0"/>
+                  <a:t>/ </a:t>
+                </a:r>
+                <a:r>
+                  <a:rPr lang="en-GB" b="1" dirty="0" err="1">
+                    <a:latin typeface="Consolas" panose="020B0609020204030204" pitchFamily="49" charset="0"/>
+                    <a:hlinkClick r:id="rId9"/>
+                  </a:rPr>
                   <a:t>atan</a:t>
                 </a:r>
                 <a:r>
                   <a:rPr lang="en-GB" b="1" dirty="0">
                     <a:latin typeface="Consolas" panose="020B0609020204030204" pitchFamily="49" charset="0"/>
-                    <a:hlinkClick r:id="rId8"/>
+                    <a:hlinkClick r:id="rId9"/>
                   </a:rPr>
                   <a:t>()</a:t>
                 </a:r>
@@ -5412,7 +5302,7 @@
             </p:nvSpPr>
             <p:spPr>
               <a:blipFill>
-                <a:blip r:embed="rId9"/>
+                <a:blip r:embed="rId12"/>
                 <a:stretch>
                   <a:fillRect l="-412"/>
                 </a:stretch>
@@ -5434,6 +5324,9 @@
         </mc:Fallback>
       </mc:AlternateContent>
     </p:spTree>
+    <p:custDataLst>
+      <p:tags r:id="rId1"/>
+    </p:custDataLst>
     <p:extLst>
       <p:ext uri="{BB962C8B-B14F-4D97-AF65-F5344CB8AC3E}">
         <p14:creationId xmlns:p14="http://schemas.microsoft.com/office/powerpoint/2010/main" val="3410643785"/>
@@ -5445,12 +5338,12 @@
   </p:clrMapOvr>
   <mc:AlternateContent xmlns:mc="http://schemas.openxmlformats.org/markup-compatibility/2006" xmlns:p14="http://schemas.microsoft.com/office/powerpoint/2010/main">
     <mc:Choice Requires="p14">
-      <p:transition spd="med" p14:dur="700">
+      <p:transition spd="med" p14:dur="700" advTm="54274">
         <p:fade/>
       </p:transition>
     </mc:Choice>
     <mc:Fallback xmlns="">
-      <p:transition spd="med">
+      <p:transition spd="med" advTm="54274">
         <p:fade/>
       </p:transition>
     </mc:Fallback>
@@ -6067,7 +5960,7 @@
                   <a:avLst/>
                 </a:prstGeom>
                 <a:blipFill>
-                  <a:blip r:embed="rId3"/>
+                  <a:blip r:embed="rId6"/>
                   <a:stretch>
                     <a:fillRect/>
                   </a:stretch>
@@ -6261,7 +6154,7 @@
                   <a:avLst/>
                 </a:prstGeom>
                 <a:blipFill>
-                  <a:blip r:embed="rId4"/>
+                  <a:blip r:embed="rId7"/>
                   <a:stretch>
                     <a:fillRect/>
                   </a:stretch>
@@ -6480,7 +6373,7 @@
                   <a:avLst/>
                 </a:prstGeom>
                 <a:blipFill>
-                  <a:blip r:embed="rId5"/>
+                  <a:blip r:embed="rId8"/>
                   <a:stretch>
                     <a:fillRect/>
                   </a:stretch>
@@ -6593,7 +6486,7 @@
                   <a:avLst/>
                 </a:prstGeom>
                 <a:blipFill>
-                  <a:blip r:embed="rId6"/>
+                  <a:blip r:embed="rId9"/>
                   <a:stretch>
                     <a:fillRect/>
                   </a:stretch>
@@ -6886,7 +6779,7 @@
                     <a:avLst/>
                   </a:prstGeom>
                   <a:blipFill>
-                    <a:blip r:embed="rId7"/>
+                    <a:blip r:embed="rId10"/>
                     <a:stretch>
                       <a:fillRect/>
                     </a:stretch>
@@ -7084,7 +6977,7 @@
                     <a:avLst/>
                   </a:prstGeom>
                   <a:blipFill>
-                    <a:blip r:embed="rId8"/>
+                    <a:blip r:embed="rId11"/>
                     <a:stretch>
                       <a:fillRect/>
                     </a:stretch>
@@ -7345,7 +7238,7 @@
                   <a:avLst/>
                 </a:prstGeom>
                 <a:blipFill>
-                  <a:blip r:embed="rId9"/>
+                  <a:blip r:embed="rId12"/>
                   <a:stretch>
                     <a:fillRect/>
                   </a:stretch>
@@ -7497,7 +7390,7 @@
                   <a:avLst/>
                 </a:prstGeom>
                 <a:blipFill>
-                  <a:blip r:embed="rId10"/>
+                  <a:blip r:embed="rId13"/>
                   <a:stretch>
                     <a:fillRect/>
                   </a:stretch>
@@ -7735,7 +7628,7 @@
                   <a:avLst/>
                 </a:prstGeom>
                 <a:blipFill>
-                  <a:blip r:embed="rId11"/>
+                  <a:blip r:embed="rId14"/>
                   <a:stretch>
                     <a:fillRect/>
                   </a:stretch>
@@ -7875,7 +7768,7 @@
                   <a:avLst/>
                 </a:prstGeom>
                 <a:blipFill>
-                  <a:blip r:embed="rId12"/>
+                  <a:blip r:embed="rId15"/>
                   <a:stretch>
                     <a:fillRect/>
                   </a:stretch>
@@ -7897,243 +7790,225 @@
           </mc:Fallback>
         </mc:AlternateContent>
       </p:grpSp>
-      <p:grpSp>
-        <p:nvGrpSpPr>
-          <p:cNvPr id="45" name="Group 44">
-            <a:extLst>
-              <a:ext uri="{FF2B5EF4-FFF2-40B4-BE49-F238E27FC236}">
-                <a16:creationId xmlns:a16="http://schemas.microsoft.com/office/drawing/2014/main" id="{3D14B9AC-6D83-443F-B301-163D65750202}"/>
-              </a:ext>
-            </a:extLst>
-          </p:cNvPr>
-          <p:cNvGrpSpPr/>
-          <p:nvPr/>
-        </p:nvGrpSpPr>
-        <p:grpSpPr>
-          <a:xfrm>
-            <a:off x="5215271" y="3462512"/>
-            <a:ext cx="3806280" cy="1734649"/>
-            <a:chOff x="5215271" y="3462512"/>
-            <a:chExt cx="3806280" cy="1734649"/>
-          </a:xfrm>
-        </p:grpSpPr>
-        <mc:AlternateContent xmlns:mc="http://schemas.openxmlformats.org/markup-compatibility/2006" xmlns:a14="http://schemas.microsoft.com/office/drawing/2010/main">
-          <mc:Choice Requires="a14">
-            <p:sp>
-              <p:nvSpPr>
-                <p:cNvPr id="43" name="TextBox 42">
-                  <a:extLst>
-                    <a:ext uri="{FF2B5EF4-FFF2-40B4-BE49-F238E27FC236}">
-                      <a16:creationId xmlns:a16="http://schemas.microsoft.com/office/drawing/2014/main" id="{BE6D0F0A-7E78-4B24-8828-B0E3164127C4}"/>
-                    </a:ext>
-                  </a:extLst>
-                </p:cNvPr>
-                <p:cNvSpPr txBox="1"/>
-                <p:nvPr/>
-              </p:nvSpPr>
-              <p:spPr>
-                <a:xfrm>
-                  <a:off x="5215271" y="4181498"/>
-                  <a:ext cx="952505" cy="1015663"/>
-                </a:xfrm>
-                <a:prstGeom prst="rect">
-                  <a:avLst/>
-                </a:prstGeom>
-                <a:noFill/>
-              </p:spPr>
-              <p:txBody>
-                <a:bodyPr wrap="none" rtlCol="0">
-                  <a:spAutoFit/>
-                </a:bodyPr>
-                <a:lstStyle/>
-                <a:p>
-                  <a:pPr/>
-                  <a14:m>
-                    <m:oMathPara xmlns:m="http://schemas.openxmlformats.org/officeDocument/2006/math">
-                      <m:oMathParaPr>
-                        <m:jc m:val="centerGroup"/>
-                      </m:oMathParaPr>
-                      <m:oMath xmlns:m="http://schemas.openxmlformats.org/officeDocument/2006/math">
-                        <m:r>
-                          <a:rPr lang="en-GB" sz="6000" b="1" i="1" smtClean="0">
-                            <a:solidFill>
-                              <a:schemeClr val="accent6">
-                                <a:lumMod val="60000"/>
-                                <a:lumOff val="40000"/>
-                              </a:schemeClr>
-                            </a:solidFill>
-                            <a:latin typeface="Cambria Math" panose="02040503050406030204" pitchFamily="18" charset="0"/>
-                          </a:rPr>
-                          <m:t>+</m:t>
-                        </m:r>
-                      </m:oMath>
-                    </m:oMathPara>
-                  </a14:m>
-                  <a:endParaRPr lang="en-GB" sz="6000" b="1" i="1" dirty="0">
-                    <a:solidFill>
-                      <a:srgbClr val="C00000"/>
-                    </a:solidFill>
-                  </a:endParaRPr>
-                </a:p>
-              </p:txBody>
-            </p:sp>
-          </mc:Choice>
-          <mc:Fallback xmlns="">
-            <p:sp>
-              <p:nvSpPr>
-                <p:cNvPr id="43" name="TextBox 42">
-                  <a:extLst>
-                    <a:ext uri="{FF2B5EF4-FFF2-40B4-BE49-F238E27FC236}">
-                      <a16:creationId xmlns:a16="http://schemas.microsoft.com/office/drawing/2014/main" id="{BE6D0F0A-7E78-4B24-8828-B0E3164127C4}"/>
-                    </a:ext>
-                  </a:extLst>
-                </p:cNvPr>
-                <p:cNvSpPr txBox="1">
-                  <a:spLocks noRot="1" noChangeAspect="1" noMove="1" noResize="1" noEditPoints="1" noAdjustHandles="1" noChangeArrowheads="1" noChangeShapeType="1" noTextEdit="1"/>
-                </p:cNvSpPr>
-                <p:nvPr/>
-              </p:nvSpPr>
-              <p:spPr>
-                <a:xfrm>
-                  <a:off x="5215271" y="4181498"/>
-                  <a:ext cx="952505" cy="1015663"/>
-                </a:xfrm>
-                <a:prstGeom prst="rect">
-                  <a:avLst/>
-                </a:prstGeom>
-                <a:blipFill>
-                  <a:blip r:embed="rId13"/>
-                  <a:stretch>
-                    <a:fillRect/>
-                  </a:stretch>
-                </a:blipFill>
-              </p:spPr>
-              <p:txBody>
-                <a:bodyPr/>
-                <a:lstStyle/>
-                <a:p>
-                  <a:r>
-                    <a:rPr lang="en-GB">
-                      <a:noFill/>
-                    </a:rPr>
-                    <a:t> </a:t>
-                  </a:r>
-                </a:p>
-              </p:txBody>
-            </p:sp>
-          </mc:Fallback>
-        </mc:AlternateContent>
-        <mc:AlternateContent xmlns:mc="http://schemas.openxmlformats.org/markup-compatibility/2006" xmlns:a14="http://schemas.microsoft.com/office/drawing/2010/main">
-          <mc:Choice Requires="a14">
-            <p:sp>
-              <p:nvSpPr>
-                <p:cNvPr id="44" name="TextBox 43">
-                  <a:extLst>
-                    <a:ext uri="{FF2B5EF4-FFF2-40B4-BE49-F238E27FC236}">
-                      <a16:creationId xmlns:a16="http://schemas.microsoft.com/office/drawing/2014/main" id="{FF89D862-96B6-4F90-9577-C39CA3076633}"/>
-                    </a:ext>
-                  </a:extLst>
-                </p:cNvPr>
-                <p:cNvSpPr txBox="1"/>
-                <p:nvPr/>
-              </p:nvSpPr>
-              <p:spPr>
-                <a:xfrm>
-                  <a:off x="8069046" y="3462512"/>
-                  <a:ext cx="952505" cy="1015663"/>
-                </a:xfrm>
-                <a:prstGeom prst="rect">
-                  <a:avLst/>
-                </a:prstGeom>
-                <a:noFill/>
-              </p:spPr>
-              <p:txBody>
-                <a:bodyPr wrap="none" rtlCol="0">
-                  <a:spAutoFit/>
-                </a:bodyPr>
-                <a:lstStyle/>
-                <a:p>
-                  <a:pPr/>
-                  <a14:m>
-                    <m:oMathPara xmlns:m="http://schemas.openxmlformats.org/officeDocument/2006/math">
-                      <m:oMathParaPr>
-                        <m:jc m:val="centerGroup"/>
-                      </m:oMathParaPr>
-                      <m:oMath xmlns:m="http://schemas.openxmlformats.org/officeDocument/2006/math">
-                        <m:r>
-                          <a:rPr lang="en-GB" sz="6000" b="1" i="1" smtClean="0">
-                            <a:solidFill>
-                              <a:schemeClr val="accent6">
-                                <a:lumMod val="60000"/>
-                                <a:lumOff val="40000"/>
-                              </a:schemeClr>
-                            </a:solidFill>
-                            <a:latin typeface="Cambria Math" panose="02040503050406030204" pitchFamily="18" charset="0"/>
-                          </a:rPr>
-                          <m:t>−</m:t>
-                        </m:r>
-                      </m:oMath>
-                    </m:oMathPara>
-                  </a14:m>
-                  <a:endParaRPr lang="en-GB" sz="6000" b="1" i="1" dirty="0">
-                    <a:solidFill>
-                      <a:schemeClr val="accent6">
-                        <a:lumMod val="60000"/>
-                        <a:lumOff val="40000"/>
-                      </a:schemeClr>
-                    </a:solidFill>
-                  </a:endParaRPr>
-                </a:p>
-              </p:txBody>
-            </p:sp>
-          </mc:Choice>
-          <mc:Fallback xmlns="">
-            <p:sp>
-              <p:nvSpPr>
-                <p:cNvPr id="44" name="TextBox 43">
-                  <a:extLst>
-                    <a:ext uri="{FF2B5EF4-FFF2-40B4-BE49-F238E27FC236}">
-                      <a16:creationId xmlns:a16="http://schemas.microsoft.com/office/drawing/2014/main" id="{FF89D862-96B6-4F90-9577-C39CA3076633}"/>
-                    </a:ext>
-                  </a:extLst>
-                </p:cNvPr>
-                <p:cNvSpPr txBox="1">
-                  <a:spLocks noRot="1" noChangeAspect="1" noMove="1" noResize="1" noEditPoints="1" noAdjustHandles="1" noChangeArrowheads="1" noChangeShapeType="1" noTextEdit="1"/>
-                </p:cNvSpPr>
-                <p:nvPr/>
-              </p:nvSpPr>
-              <p:spPr>
-                <a:xfrm>
-                  <a:off x="8069046" y="3462512"/>
-                  <a:ext cx="952505" cy="1015663"/>
-                </a:xfrm>
-                <a:prstGeom prst="rect">
-                  <a:avLst/>
-                </a:prstGeom>
-                <a:blipFill>
-                  <a:blip r:embed="rId14"/>
-                  <a:stretch>
-                    <a:fillRect/>
-                  </a:stretch>
-                </a:blipFill>
-              </p:spPr>
-              <p:txBody>
-                <a:bodyPr/>
-                <a:lstStyle/>
-                <a:p>
-                  <a:r>
-                    <a:rPr lang="en-GB">
-                      <a:noFill/>
-                    </a:rPr>
-                    <a:t> </a:t>
-                  </a:r>
-                </a:p>
-              </p:txBody>
-            </p:sp>
-          </mc:Fallback>
-        </mc:AlternateContent>
-      </p:grpSp>
+      <mc:AlternateContent xmlns:mc="http://schemas.openxmlformats.org/markup-compatibility/2006" xmlns:a14="http://schemas.microsoft.com/office/drawing/2010/main">
+        <mc:Choice Requires="a14">
+          <p:sp>
+            <p:nvSpPr>
+              <p:cNvPr id="43" name="TextBox 42">
+                <a:extLst>
+                  <a:ext uri="{FF2B5EF4-FFF2-40B4-BE49-F238E27FC236}">
+                    <a16:creationId xmlns:a16="http://schemas.microsoft.com/office/drawing/2014/main" id="{BE6D0F0A-7E78-4B24-8828-B0E3164127C4}"/>
+                  </a:ext>
+                </a:extLst>
+              </p:cNvPr>
+              <p:cNvSpPr txBox="1"/>
+              <p:nvPr/>
+            </p:nvSpPr>
+            <p:spPr>
+              <a:xfrm>
+                <a:off x="5215271" y="4181498"/>
+                <a:ext cx="952505" cy="1015663"/>
+              </a:xfrm>
+              <a:prstGeom prst="rect">
+                <a:avLst/>
+              </a:prstGeom>
+              <a:noFill/>
+            </p:spPr>
+            <p:txBody>
+              <a:bodyPr wrap="none" rtlCol="0">
+                <a:spAutoFit/>
+              </a:bodyPr>
+              <a:lstStyle/>
+              <a:p>
+                <a:pPr/>
+                <a14:m>
+                  <m:oMathPara xmlns:m="http://schemas.openxmlformats.org/officeDocument/2006/math">
+                    <m:oMathParaPr>
+                      <m:jc m:val="centerGroup"/>
+                    </m:oMathParaPr>
+                    <m:oMath xmlns:m="http://schemas.openxmlformats.org/officeDocument/2006/math">
+                      <m:r>
+                        <a:rPr lang="en-GB" sz="6000" b="1" i="1" smtClean="0">
+                          <a:solidFill>
+                            <a:schemeClr val="accent6">
+                              <a:lumMod val="60000"/>
+                              <a:lumOff val="40000"/>
+                            </a:schemeClr>
+                          </a:solidFill>
+                          <a:latin typeface="Cambria Math" panose="02040503050406030204" pitchFamily="18" charset="0"/>
+                        </a:rPr>
+                        <m:t>+</m:t>
+                      </m:r>
+                    </m:oMath>
+                  </m:oMathPara>
+                </a14:m>
+                <a:endParaRPr lang="en-GB" sz="6000" b="1" i="1" dirty="0">
+                  <a:solidFill>
+                    <a:srgbClr val="C00000"/>
+                  </a:solidFill>
+                </a:endParaRPr>
+              </a:p>
+            </p:txBody>
+          </p:sp>
+        </mc:Choice>
+        <mc:Fallback xmlns="">
+          <p:sp>
+            <p:nvSpPr>
+              <p:cNvPr id="43" name="TextBox 42">
+                <a:extLst>
+                  <a:ext uri="{FF2B5EF4-FFF2-40B4-BE49-F238E27FC236}">
+                    <a16:creationId xmlns:a16="http://schemas.microsoft.com/office/drawing/2014/main" id="{BE6D0F0A-7E78-4B24-8828-B0E3164127C4}"/>
+                  </a:ext>
+                </a:extLst>
+              </p:cNvPr>
+              <p:cNvSpPr txBox="1">
+                <a:spLocks noRot="1" noChangeAspect="1" noMove="1" noResize="1" noEditPoints="1" noAdjustHandles="1" noChangeArrowheads="1" noChangeShapeType="1" noTextEdit="1"/>
+              </p:cNvSpPr>
+              <p:nvPr/>
+            </p:nvSpPr>
+            <p:spPr>
+              <a:xfrm>
+                <a:off x="5215271" y="4181498"/>
+                <a:ext cx="952505" cy="1015663"/>
+              </a:xfrm>
+              <a:prstGeom prst="rect">
+                <a:avLst/>
+              </a:prstGeom>
+              <a:blipFill>
+                <a:blip r:embed="rId16"/>
+                <a:stretch>
+                  <a:fillRect/>
+                </a:stretch>
+              </a:blipFill>
+            </p:spPr>
+            <p:txBody>
+              <a:bodyPr/>
+              <a:lstStyle/>
+              <a:p>
+                <a:r>
+                  <a:rPr lang="en-GB">
+                    <a:noFill/>
+                  </a:rPr>
+                  <a:t> </a:t>
+                </a:r>
+              </a:p>
+            </p:txBody>
+          </p:sp>
+        </mc:Fallback>
+      </mc:AlternateContent>
+      <mc:AlternateContent xmlns:mc="http://schemas.openxmlformats.org/markup-compatibility/2006" xmlns:a14="http://schemas.microsoft.com/office/drawing/2010/main">
+        <mc:Choice Requires="a14">
+          <p:sp>
+            <p:nvSpPr>
+              <p:cNvPr id="44" name="TextBox 43">
+                <a:extLst>
+                  <a:ext uri="{FF2B5EF4-FFF2-40B4-BE49-F238E27FC236}">
+                    <a16:creationId xmlns:a16="http://schemas.microsoft.com/office/drawing/2014/main" id="{FF89D862-96B6-4F90-9577-C39CA3076633}"/>
+                  </a:ext>
+                </a:extLst>
+              </p:cNvPr>
+              <p:cNvSpPr txBox="1"/>
+              <p:nvPr/>
+            </p:nvSpPr>
+            <p:spPr>
+              <a:xfrm>
+                <a:off x="8069046" y="3462512"/>
+                <a:ext cx="952505" cy="1015663"/>
+              </a:xfrm>
+              <a:prstGeom prst="rect">
+                <a:avLst/>
+              </a:prstGeom>
+              <a:noFill/>
+            </p:spPr>
+            <p:txBody>
+              <a:bodyPr wrap="none" rtlCol="0">
+                <a:spAutoFit/>
+              </a:bodyPr>
+              <a:lstStyle/>
+              <a:p>
+                <a:pPr/>
+                <a14:m>
+                  <m:oMathPara xmlns:m="http://schemas.openxmlformats.org/officeDocument/2006/math">
+                    <m:oMathParaPr>
+                      <m:jc m:val="centerGroup"/>
+                    </m:oMathParaPr>
+                    <m:oMath xmlns:m="http://schemas.openxmlformats.org/officeDocument/2006/math">
+                      <m:r>
+                        <a:rPr lang="en-GB" sz="6000" b="1" i="1" smtClean="0">
+                          <a:solidFill>
+                            <a:schemeClr val="accent6">
+                              <a:lumMod val="60000"/>
+                              <a:lumOff val="40000"/>
+                            </a:schemeClr>
+                          </a:solidFill>
+                          <a:latin typeface="Cambria Math" panose="02040503050406030204" pitchFamily="18" charset="0"/>
+                        </a:rPr>
+                        <m:t>−</m:t>
+                      </m:r>
+                    </m:oMath>
+                  </m:oMathPara>
+                </a14:m>
+                <a:endParaRPr lang="en-GB" sz="6000" b="1" i="1" dirty="0">
+                  <a:solidFill>
+                    <a:schemeClr val="accent6">
+                      <a:lumMod val="60000"/>
+                      <a:lumOff val="40000"/>
+                    </a:schemeClr>
+                  </a:solidFill>
+                </a:endParaRPr>
+              </a:p>
+            </p:txBody>
+          </p:sp>
+        </mc:Choice>
+        <mc:Fallback xmlns="">
+          <p:sp>
+            <p:nvSpPr>
+              <p:cNvPr id="44" name="TextBox 43">
+                <a:extLst>
+                  <a:ext uri="{FF2B5EF4-FFF2-40B4-BE49-F238E27FC236}">
+                    <a16:creationId xmlns:a16="http://schemas.microsoft.com/office/drawing/2014/main" id="{FF89D862-96B6-4F90-9577-C39CA3076633}"/>
+                  </a:ext>
+                </a:extLst>
+              </p:cNvPr>
+              <p:cNvSpPr txBox="1">
+                <a:spLocks noRot="1" noChangeAspect="1" noMove="1" noResize="1" noEditPoints="1" noAdjustHandles="1" noChangeArrowheads="1" noChangeShapeType="1" noTextEdit="1"/>
+              </p:cNvSpPr>
+              <p:nvPr/>
+            </p:nvSpPr>
+            <p:spPr>
+              <a:xfrm>
+                <a:off x="8069046" y="3462512"/>
+                <a:ext cx="952505" cy="1015663"/>
+              </a:xfrm>
+              <a:prstGeom prst="rect">
+                <a:avLst/>
+              </a:prstGeom>
+              <a:blipFill>
+                <a:blip r:embed="rId17"/>
+                <a:stretch>
+                  <a:fillRect/>
+                </a:stretch>
+              </a:blipFill>
+            </p:spPr>
+            <p:txBody>
+              <a:bodyPr/>
+              <a:lstStyle/>
+              <a:p>
+                <a:r>
+                  <a:rPr lang="en-GB">
+                    <a:noFill/>
+                  </a:rPr>
+                  <a:t> </a:t>
+                </a:r>
+              </a:p>
+            </p:txBody>
+          </p:sp>
+        </mc:Fallback>
+      </mc:AlternateContent>
     </p:spTree>
+    <p:custDataLst>
+      <p:tags r:id="rId1"/>
+    </p:custDataLst>
     <p:extLst>
       <p:ext uri="{BB962C8B-B14F-4D97-AF65-F5344CB8AC3E}">
         <p14:creationId xmlns:p14="http://schemas.microsoft.com/office/powerpoint/2010/main" val="2660789764"/>
@@ -8145,12 +8020,12 @@
   </p:clrMapOvr>
   <mc:AlternateContent xmlns:mc="http://schemas.openxmlformats.org/markup-compatibility/2006" xmlns:p14="http://schemas.microsoft.com/office/powerpoint/2010/main">
     <mc:Choice Requires="p14">
-      <p:transition spd="med" p14:dur="700">
+      <p:transition spd="med" p14:dur="700" advTm="57123">
         <p:fade/>
       </p:transition>
     </mc:Choice>
     <mc:Fallback xmlns="">
-      <p:transition spd="med">
+      <p:transition spd="med" advTm="57123">
         <p:fade/>
       </p:transition>
     </mc:Fallback>
@@ -8388,7 +8263,7 @@
                             </p:stCondLst>
                             <p:childTnLst>
                               <p:par>
-                                <p:cTn id="25" presetID="10" presetClass="entr" presetSubtype="0" fill="hold" nodeType="clickEffect">
+                                <p:cTn id="25" presetID="10" presetClass="entr" presetSubtype="0" fill="hold" grpId="0" nodeType="clickEffect">
                                   <p:stCondLst>
                                     <p:cond delay="0"/>
                                   </p:stCondLst>
@@ -8401,7 +8276,7 @@
                                           </p:stCondLst>
                                         </p:cTn>
                                         <p:tgtEl>
-                                          <p:spTgt spid="45"/>
+                                          <p:spTgt spid="43"/>
                                         </p:tgtEl>
                                         <p:attrNameLst>
                                           <p:attrName>style.visibility</p:attrName>
@@ -8415,7 +8290,60 @@
                                       <p:cBhvr>
                                         <p:cTn id="27" dur="500"/>
                                         <p:tgtEl>
-                                          <p:spTgt spid="45"/>
+                                          <p:spTgt spid="43"/>
+                                        </p:tgtEl>
+                                      </p:cBhvr>
+                                    </p:animEffect>
+                                  </p:childTnLst>
+                                </p:cTn>
+                              </p:par>
+                            </p:childTnLst>
+                          </p:cTn>
+                        </p:par>
+                      </p:childTnLst>
+                    </p:cTn>
+                  </p:par>
+                  <p:par>
+                    <p:cTn id="28" fill="hold">
+                      <p:stCondLst>
+                        <p:cond delay="indefinite"/>
+                      </p:stCondLst>
+                      <p:childTnLst>
+                        <p:par>
+                          <p:cTn id="29" fill="hold">
+                            <p:stCondLst>
+                              <p:cond delay="0"/>
+                            </p:stCondLst>
+                            <p:childTnLst>
+                              <p:par>
+                                <p:cTn id="30" presetID="10" presetClass="entr" presetSubtype="0" fill="hold" grpId="0" nodeType="clickEffect">
+                                  <p:stCondLst>
+                                    <p:cond delay="0"/>
+                                  </p:stCondLst>
+                                  <p:childTnLst>
+                                    <p:set>
+                                      <p:cBhvr>
+                                        <p:cTn id="31" dur="1" fill="hold">
+                                          <p:stCondLst>
+                                            <p:cond delay="0"/>
+                                          </p:stCondLst>
+                                        </p:cTn>
+                                        <p:tgtEl>
+                                          <p:spTgt spid="44"/>
+                                        </p:tgtEl>
+                                        <p:attrNameLst>
+                                          <p:attrName>style.visibility</p:attrName>
+                                        </p:attrNameLst>
+                                      </p:cBhvr>
+                                      <p:to>
+                                        <p:strVal val="visible"/>
+                                      </p:to>
+                                    </p:set>
+                                    <p:animEffect transition="in" filter="fade">
+                                      <p:cBhvr>
+                                        <p:cTn id="32" dur="500"/>
+                                        <p:tgtEl>
+                                          <p:spTgt spid="44"/>
                                         </p:tgtEl>
                                       </p:cBhvr>
                                     </p:animEffect>
@@ -8449,6 +8377,10 @@
         </p:cTn>
       </p:par>
     </p:tnLst>
+    <p:bldLst>
+      <p:bldP spid="43" grpId="0"/>
+      <p:bldP spid="44" grpId="0"/>
+    </p:bldLst>
   </p:timing>
 </p:sld>
 </file>
@@ -8843,7 +8775,7 @@
                   <a:avLst/>
                 </a:prstGeom>
                 <a:blipFill>
-                  <a:blip r:embed="rId3"/>
+                  <a:blip r:embed="rId6"/>
                   <a:stretch>
                     <a:fillRect/>
                   </a:stretch>
@@ -9037,7 +8969,7 @@
                   <a:avLst/>
                 </a:prstGeom>
                 <a:blipFill>
-                  <a:blip r:embed="rId4"/>
+                  <a:blip r:embed="rId7"/>
                   <a:stretch>
                     <a:fillRect/>
                   </a:stretch>
@@ -9256,7 +9188,7 @@
                   <a:avLst/>
                 </a:prstGeom>
                 <a:blipFill>
-                  <a:blip r:embed="rId5"/>
+                  <a:blip r:embed="rId8"/>
                   <a:stretch>
                     <a:fillRect/>
                   </a:stretch>
@@ -9369,7 +9301,7 @@
                   <a:avLst/>
                 </a:prstGeom>
                 <a:blipFill>
-                  <a:blip r:embed="rId6"/>
+                  <a:blip r:embed="rId9"/>
                   <a:stretch>
                     <a:fillRect/>
                   </a:stretch>
@@ -9662,7 +9594,7 @@
                     <a:avLst/>
                   </a:prstGeom>
                   <a:blipFill>
-                    <a:blip r:embed="rId7"/>
+                    <a:blip r:embed="rId10"/>
                     <a:stretch>
                       <a:fillRect/>
                     </a:stretch>
@@ -9860,7 +9792,7 @@
                     <a:avLst/>
                   </a:prstGeom>
                   <a:blipFill>
-                    <a:blip r:embed="rId8"/>
+                    <a:blip r:embed="rId11"/>
                     <a:stretch>
                       <a:fillRect/>
                     </a:stretch>
@@ -10163,7 +10095,7 @@
                   <a:avLst/>
                 </a:prstGeom>
                 <a:blipFill>
-                  <a:blip r:embed="rId9"/>
+                  <a:blip r:embed="rId12"/>
                   <a:stretch>
                     <a:fillRect/>
                   </a:stretch>
@@ -10407,7 +10339,7 @@
                   <a:avLst/>
                 </a:prstGeom>
                 <a:blipFill>
-                  <a:blip r:embed="rId10"/>
+                  <a:blip r:embed="rId13"/>
                   <a:stretch>
                     <a:fillRect/>
                   </a:stretch>
@@ -10828,7 +10760,7 @@
                 <a:avLst/>
               </a:prstGeom>
               <a:blipFill>
-                <a:blip r:embed="rId11"/>
+                <a:blip r:embed="rId14"/>
                 <a:stretch>
                   <a:fillRect/>
                 </a:stretch>
@@ -10851,10 +10783,10 @@
       </mc:AlternateContent>
       <p:grpSp>
         <p:nvGrpSpPr>
-          <p:cNvPr id="3" name="Group 2">
+          <p:cNvPr id="47" name="Group 46">
             <a:extLst>
               <a:ext uri="{FF2B5EF4-FFF2-40B4-BE49-F238E27FC236}">
-                <a16:creationId xmlns:a16="http://schemas.microsoft.com/office/drawing/2014/main" id="{534D8B8B-7BF5-4CE2-85D3-2957B1336E88}"/>
+                <a16:creationId xmlns:a16="http://schemas.microsoft.com/office/drawing/2014/main" id="{58B1D037-ADB3-44FC-9138-DA0E8EB6C58E}"/>
               </a:ext>
             </a:extLst>
           </p:cNvPr>
@@ -10862,91 +10794,122 @@
           <p:nvPr/>
         </p:nvGrpSpPr>
         <p:grpSpPr>
-          <a:xfrm>
-            <a:off x="606311" y="1407765"/>
-            <a:ext cx="3619430" cy="3806750"/>
-            <a:chOff x="606311" y="1407765"/>
-            <a:chExt cx="3619430" cy="3806750"/>
+          <a:xfrm flipH="1">
+            <a:off x="2083109" y="3488576"/>
+            <a:ext cx="2142632" cy="1725939"/>
+            <a:chOff x="4526279" y="3988640"/>
+            <a:chExt cx="2142632" cy="1725939"/>
           </a:xfrm>
         </p:grpSpPr>
-        <p:grpSp>
-          <p:nvGrpSpPr>
-            <p:cNvPr id="47" name="Group 46">
+        <p:sp>
+          <p:nvSpPr>
+            <p:cNvPr id="48" name="Arc 47">
               <a:extLst>
                 <a:ext uri="{FF2B5EF4-FFF2-40B4-BE49-F238E27FC236}">
-                  <a16:creationId xmlns:a16="http://schemas.microsoft.com/office/drawing/2014/main" id="{58B1D037-ADB3-44FC-9138-DA0E8EB6C58E}"/>
+                  <a16:creationId xmlns:a16="http://schemas.microsoft.com/office/drawing/2014/main" id="{380C1B8A-9074-41FA-8856-4ACA50967880}"/>
                 </a:ext>
               </a:extLst>
             </p:cNvPr>
-            <p:cNvGrpSpPr/>
+            <p:cNvSpPr/>
             <p:nvPr/>
-          </p:nvGrpSpPr>
-          <p:grpSpPr>
+          </p:nvSpPr>
+          <p:spPr>
             <a:xfrm flipH="1">
-              <a:off x="2083109" y="3488576"/>
-              <a:ext cx="2142632" cy="1725939"/>
-              <a:chOff x="4526279" y="3988640"/>
-              <a:chExt cx="2142632" cy="1725939"/>
+              <a:off x="5044439" y="3988640"/>
+              <a:ext cx="1624472" cy="1725939"/>
             </a:xfrm>
-          </p:grpSpPr>
-          <p:sp>
-            <p:nvSpPr>
-              <p:cNvPr id="48" name="Arc 47">
-                <a:extLst>
-                  <a:ext uri="{FF2B5EF4-FFF2-40B4-BE49-F238E27FC236}">
-                    <a16:creationId xmlns:a16="http://schemas.microsoft.com/office/drawing/2014/main" id="{380C1B8A-9074-41FA-8856-4ACA50967880}"/>
-                  </a:ext>
-                </a:extLst>
-              </p:cNvPr>
-              <p:cNvSpPr/>
-              <p:nvPr/>
-            </p:nvSpPr>
-            <p:spPr>
-              <a:xfrm flipH="1">
-                <a:off x="5044439" y="3988640"/>
-                <a:ext cx="1624472" cy="1725939"/>
-              </a:xfrm>
-              <a:prstGeom prst="arc">
-                <a:avLst>
-                  <a:gd name="adj1" fmla="val 19815114"/>
-                  <a:gd name="adj2" fmla="val 21189489"/>
-                </a:avLst>
-              </a:prstGeom>
-              <a:ln w="38100">
+            <a:prstGeom prst="arc">
+              <a:avLst>
+                <a:gd name="adj1" fmla="val 19815114"/>
+                <a:gd name="adj2" fmla="val 21189489"/>
+              </a:avLst>
+            </a:prstGeom>
+            <a:ln w="38100">
+              <a:solidFill>
+                <a:schemeClr val="accent4"/>
+              </a:solidFill>
+            </a:ln>
+          </p:spPr>
+          <p:style>
+            <a:lnRef idx="1">
+              <a:schemeClr val="accent1"/>
+            </a:lnRef>
+            <a:fillRef idx="0">
+              <a:schemeClr val="accent1"/>
+            </a:fillRef>
+            <a:effectRef idx="0">
+              <a:schemeClr val="accent1"/>
+            </a:effectRef>
+            <a:fontRef idx="minor">
+              <a:schemeClr val="tx1"/>
+            </a:fontRef>
+          </p:style>
+          <p:txBody>
+            <a:bodyPr rtlCol="0" anchor="ctr"/>
+            <a:lstStyle/>
+            <a:p>
+              <a:pPr algn="ctr"/>
+              <a:endParaRPr lang="en-GB"/>
+            </a:p>
+          </p:txBody>
+        </p:sp>
+        <p:sp>
+          <p:nvSpPr>
+            <p:cNvPr id="49" name="TextBox 48">
+              <a:extLst>
+                <a:ext uri="{FF2B5EF4-FFF2-40B4-BE49-F238E27FC236}">
+                  <a16:creationId xmlns:a16="http://schemas.microsoft.com/office/drawing/2014/main" id="{7EFD325E-62F1-4BA3-A010-70F61AFBCE21}"/>
+                </a:ext>
+              </a:extLst>
+            </p:cNvPr>
+            <p:cNvSpPr txBox="1"/>
+            <p:nvPr/>
+          </p:nvSpPr>
+          <p:spPr>
+            <a:xfrm>
+              <a:off x="4526279" y="4215473"/>
+              <a:ext cx="518160" cy="646331"/>
+            </a:xfrm>
+            <a:prstGeom prst="rect">
+              <a:avLst/>
+            </a:prstGeom>
+            <a:noFill/>
+          </p:spPr>
+          <p:txBody>
+            <a:bodyPr wrap="square" rtlCol="0">
+              <a:spAutoFit/>
+            </a:bodyPr>
+            <a:lstStyle/>
+            <a:p>
+              <a:r>
+                <a:rPr lang="el-GR" sz="3600" i="1" dirty="0">
+                  <a:solidFill>
+                    <a:schemeClr val="accent4"/>
+                  </a:solidFill>
+                  <a:latin typeface="Cambria Math" panose="02040503050406030204" pitchFamily="18" charset="0"/>
+                  <a:ea typeface="Cambria Math" panose="02040503050406030204" pitchFamily="18" charset="0"/>
+                </a:rPr>
+                <a:t>θ</a:t>
+              </a:r>
+              <a:endParaRPr lang="en-GB" sz="3600" i="1" dirty="0">
                 <a:solidFill>
                   <a:schemeClr val="accent4"/>
                 </a:solidFill>
-              </a:ln>
-            </p:spPr>
-            <p:style>
-              <a:lnRef idx="1">
-                <a:schemeClr val="accent1"/>
-              </a:lnRef>
-              <a:fillRef idx="0">
-                <a:schemeClr val="accent1"/>
-              </a:fillRef>
-              <a:effectRef idx="0">
-                <a:schemeClr val="accent1"/>
-              </a:effectRef>
-              <a:fontRef idx="minor">
-                <a:schemeClr val="tx1"/>
-              </a:fontRef>
-            </p:style>
-            <p:txBody>
-              <a:bodyPr rtlCol="0" anchor="ctr"/>
-              <a:lstStyle/>
-              <a:p>
-                <a:pPr algn="ctr"/>
-                <a:endParaRPr lang="en-GB"/>
-              </a:p>
-            </p:txBody>
-          </p:sp>
+                <a:latin typeface="Cambria Math" panose="02040503050406030204" pitchFamily="18" charset="0"/>
+                <a:ea typeface="Cambria Math" panose="02040503050406030204" pitchFamily="18" charset="0"/>
+              </a:endParaRPr>
+            </a:p>
+          </p:txBody>
+        </p:sp>
+      </p:grpSp>
+      <mc:AlternateContent xmlns:mc="http://schemas.openxmlformats.org/markup-compatibility/2006" xmlns:a14="http://schemas.microsoft.com/office/drawing/2010/main">
+        <mc:Choice Requires="a14">
           <p:sp>
             <p:nvSpPr>
-              <p:cNvPr id="49" name="TextBox 48">
+              <p:cNvPr id="50" name="TextBox 49">
                 <a:extLst>
                   <a:ext uri="{FF2B5EF4-FFF2-40B4-BE49-F238E27FC236}">
-                    <a16:creationId xmlns:a16="http://schemas.microsoft.com/office/drawing/2014/main" id="{7EFD325E-62F1-4BA3-A010-70F61AFBCE21}"/>
+                    <a16:creationId xmlns:a16="http://schemas.microsoft.com/office/drawing/2014/main" id="{5A78ABC9-7BC2-464B-BD6A-BA255E299A87}"/>
                   </a:ext>
                 </a:extLst>
               </p:cNvPr>
@@ -10955,8 +10918,8 @@
             </p:nvSpPr>
             <p:spPr>
               <a:xfrm>
-                <a:off x="4526279" y="4215473"/>
-                <a:ext cx="518160" cy="646331"/>
+                <a:off x="606311" y="1407765"/>
+                <a:ext cx="2771976" cy="902876"/>
               </a:xfrm>
               <a:prstGeom prst="rect">
                 <a:avLst/>
@@ -10964,343 +10927,291 @@
               <a:noFill/>
             </p:spPr>
             <p:txBody>
-              <a:bodyPr wrap="square" rtlCol="0">
+              <a:bodyPr wrap="none" rtlCol="0">
                 <a:spAutoFit/>
               </a:bodyPr>
               <a:lstStyle/>
               <a:p>
-                <a:r>
-                  <a:rPr lang="el-GR" sz="3600" i="1" dirty="0">
-                    <a:solidFill>
-                      <a:schemeClr val="accent4"/>
-                    </a:solidFill>
-                    <a:latin typeface="Cambria Math" panose="02040503050406030204" pitchFamily="18" charset="0"/>
-                    <a:ea typeface="Cambria Math" panose="02040503050406030204" pitchFamily="18" charset="0"/>
-                  </a:rPr>
-                  <a:t>θ</a:t>
-                </a:r>
-                <a:endParaRPr lang="en-GB" sz="3600" i="1" dirty="0">
+                <a:pPr/>
+                <a14:m>
+                  <m:oMathPara xmlns:m="http://schemas.openxmlformats.org/officeDocument/2006/math">
+                    <m:oMathParaPr>
+                      <m:jc m:val="centerGroup"/>
+                    </m:oMathParaPr>
+                    <m:oMath xmlns:m="http://schemas.openxmlformats.org/officeDocument/2006/math">
+                      <m:func>
+                        <m:funcPr>
+                          <m:ctrlPr>
+                            <a:rPr lang="en-GB" sz="2800" i="1" dirty="0" smtClean="0">
+                              <a:solidFill>
+                                <a:schemeClr val="accent4"/>
+                              </a:solidFill>
+                              <a:latin typeface="Cambria Math" panose="02040503050406030204" pitchFamily="18" charset="0"/>
+                            </a:rPr>
+                          </m:ctrlPr>
+                        </m:funcPr>
+                        <m:fName>
+                          <m:r>
+                            <m:rPr>
+                              <m:sty m:val="p"/>
+                            </m:rPr>
+                            <a:rPr lang="en-GB" sz="2800" dirty="0">
+                              <a:solidFill>
+                                <a:schemeClr val="accent4"/>
+                              </a:solidFill>
+                              <a:latin typeface="Cambria Math" panose="02040503050406030204" pitchFamily="18" charset="0"/>
+                            </a:rPr>
+                            <m:t>tan</m:t>
+                          </m:r>
+                        </m:fName>
+                        <m:e>
+                          <m:r>
+                            <a:rPr lang="en-GB" sz="2800" i="1" dirty="0">
+                              <a:solidFill>
+                                <a:schemeClr val="accent4"/>
+                              </a:solidFill>
+                              <a:latin typeface="Cambria Math" panose="02040503050406030204" pitchFamily="18" charset="0"/>
+                            </a:rPr>
+                            <m:t>𝜃</m:t>
+                          </m:r>
+                        </m:e>
+                      </m:func>
+                      <m:r>
+                        <a:rPr lang="en-GB" sz="2800" i="0" dirty="0">
+                          <a:solidFill>
+                            <a:schemeClr val="accent4"/>
+                          </a:solidFill>
+                          <a:latin typeface="Cambria Math" panose="02040503050406030204" pitchFamily="18" charset="0"/>
+                        </a:rPr>
+                        <m:t>=</m:t>
+                      </m:r>
+                      <m:f>
+                        <m:fPr>
+                          <m:ctrlPr>
+                            <a:rPr lang="en-GB" sz="2800" i="1" dirty="0">
+                              <a:solidFill>
+                                <a:schemeClr val="accent4"/>
+                              </a:solidFill>
+                              <a:latin typeface="Cambria Math" panose="02040503050406030204" pitchFamily="18" charset="0"/>
+                            </a:rPr>
+                          </m:ctrlPr>
+                        </m:fPr>
+                        <m:num>
+                          <m:sSub>
+                            <m:sSubPr>
+                              <m:ctrlPr>
+                                <a:rPr lang="en-GB" sz="2800" i="1" dirty="0">
+                                  <a:solidFill>
+                                    <a:schemeClr val="accent4"/>
+                                  </a:solidFill>
+                                  <a:latin typeface="Cambria Math" panose="02040503050406030204" pitchFamily="18" charset="0"/>
+                                </a:rPr>
+                              </m:ctrlPr>
+                            </m:sSubPr>
+                            <m:e>
+                              <m:r>
+                                <a:rPr lang="en-GB" sz="2800" i="1" dirty="0">
+                                  <a:solidFill>
+                                    <a:schemeClr val="accent4"/>
+                                  </a:solidFill>
+                                  <a:latin typeface="Cambria Math" panose="02040503050406030204" pitchFamily="18" charset="0"/>
+                                </a:rPr>
+                                <m:t>𝑦</m:t>
+                              </m:r>
+                            </m:e>
+                            <m:sub>
+                              <m:r>
+                                <a:rPr lang="en-GB" sz="2800" i="1" dirty="0">
+                                  <a:solidFill>
+                                    <a:schemeClr val="accent4"/>
+                                  </a:solidFill>
+                                  <a:latin typeface="Cambria Math" panose="02040503050406030204" pitchFamily="18" charset="0"/>
+                                </a:rPr>
+                                <m:t>𝑏</m:t>
+                              </m:r>
+                            </m:sub>
+                          </m:sSub>
+                          <m:r>
+                            <a:rPr lang="en-GB" sz="2800" i="0" dirty="0">
+                              <a:solidFill>
+                                <a:schemeClr val="accent4"/>
+                              </a:solidFill>
+                              <a:latin typeface="Cambria Math" panose="02040503050406030204" pitchFamily="18" charset="0"/>
+                            </a:rPr>
+                            <m:t>−</m:t>
+                          </m:r>
+                          <m:sSub>
+                            <m:sSubPr>
+                              <m:ctrlPr>
+                                <a:rPr lang="en-GB" sz="2800" i="1" dirty="0">
+                                  <a:solidFill>
+                                    <a:schemeClr val="accent4"/>
+                                  </a:solidFill>
+                                  <a:latin typeface="Cambria Math" panose="02040503050406030204" pitchFamily="18" charset="0"/>
+                                </a:rPr>
+                              </m:ctrlPr>
+                            </m:sSubPr>
+                            <m:e>
+                              <m:r>
+                                <a:rPr lang="en-GB" sz="2800" i="1" dirty="0">
+                                  <a:solidFill>
+                                    <a:schemeClr val="accent4"/>
+                                  </a:solidFill>
+                                  <a:latin typeface="Cambria Math" panose="02040503050406030204" pitchFamily="18" charset="0"/>
+                                </a:rPr>
+                                <m:t>𝑦</m:t>
+                              </m:r>
+                            </m:e>
+                            <m:sub>
+                              <m:r>
+                                <a:rPr lang="en-GB" sz="2800" b="0" i="1" dirty="0" smtClean="0">
+                                  <a:solidFill>
+                                    <a:schemeClr val="accent4"/>
+                                  </a:solidFill>
+                                  <a:latin typeface="Cambria Math" panose="02040503050406030204" pitchFamily="18" charset="0"/>
+                                </a:rPr>
+                                <m:t>𝑎</m:t>
+                              </m:r>
+                            </m:sub>
+                          </m:sSub>
+                        </m:num>
+                        <m:den>
+                          <m:sSub>
+                            <m:sSubPr>
+                              <m:ctrlPr>
+                                <a:rPr lang="en-GB" sz="2800" i="1" dirty="0">
+                                  <a:solidFill>
+                                    <a:schemeClr val="accent4"/>
+                                  </a:solidFill>
+                                  <a:latin typeface="Cambria Math" panose="02040503050406030204" pitchFamily="18" charset="0"/>
+                                </a:rPr>
+                              </m:ctrlPr>
+                            </m:sSubPr>
+                            <m:e>
+                              <m:r>
+                                <a:rPr lang="en-GB" sz="2800" i="1" dirty="0">
+                                  <a:solidFill>
+                                    <a:schemeClr val="accent4"/>
+                                  </a:solidFill>
+                                  <a:latin typeface="Cambria Math" panose="02040503050406030204" pitchFamily="18" charset="0"/>
+                                </a:rPr>
+                                <m:t>𝑥</m:t>
+                              </m:r>
+                            </m:e>
+                            <m:sub>
+                              <m:r>
+                                <a:rPr lang="en-GB" sz="2800" i="1" dirty="0">
+                                  <a:solidFill>
+                                    <a:schemeClr val="accent4"/>
+                                  </a:solidFill>
+                                  <a:latin typeface="Cambria Math" panose="02040503050406030204" pitchFamily="18" charset="0"/>
+                                </a:rPr>
+                                <m:t>𝑏</m:t>
+                              </m:r>
+                            </m:sub>
+                          </m:sSub>
+                          <m:r>
+                            <a:rPr lang="en-GB" sz="2800" i="0" dirty="0">
+                              <a:solidFill>
+                                <a:schemeClr val="accent4"/>
+                              </a:solidFill>
+                              <a:latin typeface="Cambria Math" panose="02040503050406030204" pitchFamily="18" charset="0"/>
+                            </a:rPr>
+                            <m:t>−</m:t>
+                          </m:r>
+                          <m:sSub>
+                            <m:sSubPr>
+                              <m:ctrlPr>
+                                <a:rPr lang="en-GB" sz="2800" i="1" dirty="0">
+                                  <a:solidFill>
+                                    <a:schemeClr val="accent4"/>
+                                  </a:solidFill>
+                                  <a:latin typeface="Cambria Math" panose="02040503050406030204" pitchFamily="18" charset="0"/>
+                                </a:rPr>
+                              </m:ctrlPr>
+                            </m:sSubPr>
+                            <m:e>
+                              <m:r>
+                                <a:rPr lang="en-GB" sz="2800" i="1" dirty="0">
+                                  <a:solidFill>
+                                    <a:schemeClr val="accent4"/>
+                                  </a:solidFill>
+                                  <a:latin typeface="Cambria Math" panose="02040503050406030204" pitchFamily="18" charset="0"/>
+                                </a:rPr>
+                                <m:t>𝑥</m:t>
+                              </m:r>
+                            </m:e>
+                            <m:sub>
+                              <m:r>
+                                <a:rPr lang="en-GB" sz="2800" i="1" dirty="0">
+                                  <a:solidFill>
+                                    <a:schemeClr val="accent4"/>
+                                  </a:solidFill>
+                                  <a:latin typeface="Cambria Math" panose="02040503050406030204" pitchFamily="18" charset="0"/>
+                                </a:rPr>
+                                <m:t>𝑎</m:t>
+                              </m:r>
+                            </m:sub>
+                          </m:sSub>
+                        </m:den>
+                      </m:f>
+                    </m:oMath>
+                  </m:oMathPara>
+                </a14:m>
+                <a:endParaRPr lang="en-GB" sz="2800" dirty="0">
                   <a:solidFill>
                     <a:schemeClr val="accent4"/>
                   </a:solidFill>
-                  <a:latin typeface="Cambria Math" panose="02040503050406030204" pitchFamily="18" charset="0"/>
-                  <a:ea typeface="Cambria Math" panose="02040503050406030204" pitchFamily="18" charset="0"/>
                 </a:endParaRPr>
               </a:p>
             </p:txBody>
           </p:sp>
-        </p:grpSp>
-        <mc:AlternateContent xmlns:mc="http://schemas.openxmlformats.org/markup-compatibility/2006" xmlns:a14="http://schemas.microsoft.com/office/drawing/2010/main">
-          <mc:Choice Requires="a14">
-            <p:sp>
-              <p:nvSpPr>
-                <p:cNvPr id="50" name="TextBox 49">
-                  <a:extLst>
-                    <a:ext uri="{FF2B5EF4-FFF2-40B4-BE49-F238E27FC236}">
-                      <a16:creationId xmlns:a16="http://schemas.microsoft.com/office/drawing/2014/main" id="{5A78ABC9-7BC2-464B-BD6A-BA255E299A87}"/>
-                    </a:ext>
-                  </a:extLst>
-                </p:cNvPr>
-                <p:cNvSpPr txBox="1"/>
-                <p:nvPr/>
-              </p:nvSpPr>
-              <p:spPr>
-                <a:xfrm>
-                  <a:off x="606311" y="1407765"/>
-                  <a:ext cx="2771976" cy="902876"/>
-                </a:xfrm>
-                <a:prstGeom prst="rect">
-                  <a:avLst/>
-                </a:prstGeom>
-                <a:noFill/>
-              </p:spPr>
-              <p:txBody>
-                <a:bodyPr wrap="none" rtlCol="0">
-                  <a:spAutoFit/>
-                </a:bodyPr>
-                <a:lstStyle/>
-                <a:p>
-                  <a:pPr/>
-                  <a14:m>
-                    <m:oMathPara xmlns:m="http://schemas.openxmlformats.org/officeDocument/2006/math">
-                      <m:oMathParaPr>
-                        <m:jc m:val="centerGroup"/>
-                      </m:oMathParaPr>
-                      <m:oMath xmlns:m="http://schemas.openxmlformats.org/officeDocument/2006/math">
-                        <m:func>
-                          <m:funcPr>
-                            <m:ctrlPr>
-                              <a:rPr lang="en-GB" sz="2800" i="1" dirty="0" smtClean="0">
-                                <a:solidFill>
-                                  <a:schemeClr val="accent4"/>
-                                </a:solidFill>
-                                <a:latin typeface="Cambria Math" panose="02040503050406030204" pitchFamily="18" charset="0"/>
-                              </a:rPr>
-                            </m:ctrlPr>
-                          </m:funcPr>
-                          <m:fName>
-                            <m:r>
-                              <m:rPr>
-                                <m:sty m:val="p"/>
-                              </m:rPr>
-                              <a:rPr lang="en-GB" sz="2800" dirty="0">
-                                <a:solidFill>
-                                  <a:schemeClr val="accent4"/>
-                                </a:solidFill>
-                                <a:latin typeface="Cambria Math" panose="02040503050406030204" pitchFamily="18" charset="0"/>
-                              </a:rPr>
-                              <m:t>tan</m:t>
-                            </m:r>
-                          </m:fName>
-                          <m:e>
-                            <m:r>
-                              <a:rPr lang="en-GB" sz="2800" i="1" dirty="0">
-                                <a:solidFill>
-                                  <a:schemeClr val="accent4"/>
-                                </a:solidFill>
-                                <a:latin typeface="Cambria Math" panose="02040503050406030204" pitchFamily="18" charset="0"/>
-                              </a:rPr>
-                              <m:t>𝜃</m:t>
-                            </m:r>
-                          </m:e>
-                        </m:func>
-                        <m:r>
-                          <a:rPr lang="en-GB" sz="2800" i="0" dirty="0">
-                            <a:solidFill>
-                              <a:schemeClr val="accent4"/>
-                            </a:solidFill>
-                            <a:latin typeface="Cambria Math" panose="02040503050406030204" pitchFamily="18" charset="0"/>
-                          </a:rPr>
-                          <m:t>=</m:t>
-                        </m:r>
-                        <m:f>
-                          <m:fPr>
-                            <m:ctrlPr>
-                              <a:rPr lang="en-GB" sz="2800" i="1" dirty="0">
-                                <a:solidFill>
-                                  <a:schemeClr val="accent4"/>
-                                </a:solidFill>
-                                <a:latin typeface="Cambria Math" panose="02040503050406030204" pitchFamily="18" charset="0"/>
-                              </a:rPr>
-                            </m:ctrlPr>
-                          </m:fPr>
-                          <m:num>
-                            <m:sSub>
-                              <m:sSubPr>
-                                <m:ctrlPr>
-                                  <a:rPr lang="en-GB" sz="2800" i="1" dirty="0">
-                                    <a:solidFill>
-                                      <a:schemeClr val="accent4"/>
-                                    </a:solidFill>
-                                    <a:latin typeface="Cambria Math" panose="02040503050406030204" pitchFamily="18" charset="0"/>
-                                  </a:rPr>
-                                </m:ctrlPr>
-                              </m:sSubPr>
-                              <m:e>
-                                <m:r>
-                                  <a:rPr lang="en-GB" sz="2800" i="1" dirty="0">
-                                    <a:solidFill>
-                                      <a:schemeClr val="accent4"/>
-                                    </a:solidFill>
-                                    <a:latin typeface="Cambria Math" panose="02040503050406030204" pitchFamily="18" charset="0"/>
-                                  </a:rPr>
-                                  <m:t>𝑦</m:t>
-                                </m:r>
-                              </m:e>
-                              <m:sub>
-                                <m:r>
-                                  <a:rPr lang="en-GB" sz="2800" i="1" dirty="0">
-                                    <a:solidFill>
-                                      <a:schemeClr val="accent4"/>
-                                    </a:solidFill>
-                                    <a:latin typeface="Cambria Math" panose="02040503050406030204" pitchFamily="18" charset="0"/>
-                                  </a:rPr>
-                                  <m:t>𝑏</m:t>
-                                </m:r>
-                              </m:sub>
-                            </m:sSub>
-                            <m:r>
-                              <a:rPr lang="en-GB" sz="2800" i="0" dirty="0">
-                                <a:solidFill>
-                                  <a:schemeClr val="accent4"/>
-                                </a:solidFill>
-                                <a:latin typeface="Cambria Math" panose="02040503050406030204" pitchFamily="18" charset="0"/>
-                              </a:rPr>
-                              <m:t>−</m:t>
-                            </m:r>
-                            <m:sSub>
-                              <m:sSubPr>
-                                <m:ctrlPr>
-                                  <a:rPr lang="en-GB" sz="2800" i="1" dirty="0">
-                                    <a:solidFill>
-                                      <a:schemeClr val="accent4"/>
-                                    </a:solidFill>
-                                    <a:latin typeface="Cambria Math" panose="02040503050406030204" pitchFamily="18" charset="0"/>
-                                  </a:rPr>
-                                </m:ctrlPr>
-                              </m:sSubPr>
-                              <m:e>
-                                <m:r>
-                                  <a:rPr lang="en-GB" sz="2800" i="1" dirty="0">
-                                    <a:solidFill>
-                                      <a:schemeClr val="accent4"/>
-                                    </a:solidFill>
-                                    <a:latin typeface="Cambria Math" panose="02040503050406030204" pitchFamily="18" charset="0"/>
-                                  </a:rPr>
-                                  <m:t>𝑦</m:t>
-                                </m:r>
-                              </m:e>
-                              <m:sub>
-                                <m:r>
-                                  <a:rPr lang="en-GB" sz="2800" b="0" i="1" dirty="0" smtClean="0">
-                                    <a:solidFill>
-                                      <a:schemeClr val="accent4"/>
-                                    </a:solidFill>
-                                    <a:latin typeface="Cambria Math" panose="02040503050406030204" pitchFamily="18" charset="0"/>
-                                  </a:rPr>
-                                  <m:t>𝑎</m:t>
-                                </m:r>
-                              </m:sub>
-                            </m:sSub>
-                          </m:num>
-                          <m:den>
-                            <m:sSub>
-                              <m:sSubPr>
-                                <m:ctrlPr>
-                                  <a:rPr lang="en-GB" sz="2800" i="1" dirty="0">
-                                    <a:solidFill>
-                                      <a:schemeClr val="accent4"/>
-                                    </a:solidFill>
-                                    <a:latin typeface="Cambria Math" panose="02040503050406030204" pitchFamily="18" charset="0"/>
-                                  </a:rPr>
-                                </m:ctrlPr>
-                              </m:sSubPr>
-                              <m:e>
-                                <m:r>
-                                  <a:rPr lang="en-GB" sz="2800" i="1" dirty="0">
-                                    <a:solidFill>
-                                      <a:schemeClr val="accent4"/>
-                                    </a:solidFill>
-                                    <a:latin typeface="Cambria Math" panose="02040503050406030204" pitchFamily="18" charset="0"/>
-                                  </a:rPr>
-                                  <m:t>𝑥</m:t>
-                                </m:r>
-                              </m:e>
-                              <m:sub>
-                                <m:r>
-                                  <a:rPr lang="en-GB" sz="2800" i="1" dirty="0">
-                                    <a:solidFill>
-                                      <a:schemeClr val="accent4"/>
-                                    </a:solidFill>
-                                    <a:latin typeface="Cambria Math" panose="02040503050406030204" pitchFamily="18" charset="0"/>
-                                  </a:rPr>
-                                  <m:t>𝑏</m:t>
-                                </m:r>
-                              </m:sub>
-                            </m:sSub>
-                            <m:r>
-                              <a:rPr lang="en-GB" sz="2800" i="0" dirty="0">
-                                <a:solidFill>
-                                  <a:schemeClr val="accent4"/>
-                                </a:solidFill>
-                                <a:latin typeface="Cambria Math" panose="02040503050406030204" pitchFamily="18" charset="0"/>
-                              </a:rPr>
-                              <m:t>−</m:t>
-                            </m:r>
-                            <m:sSub>
-                              <m:sSubPr>
-                                <m:ctrlPr>
-                                  <a:rPr lang="en-GB" sz="2800" i="1" dirty="0">
-                                    <a:solidFill>
-                                      <a:schemeClr val="accent4"/>
-                                    </a:solidFill>
-                                    <a:latin typeface="Cambria Math" panose="02040503050406030204" pitchFamily="18" charset="0"/>
-                                  </a:rPr>
-                                </m:ctrlPr>
-                              </m:sSubPr>
-                              <m:e>
-                                <m:r>
-                                  <a:rPr lang="en-GB" sz="2800" i="1" dirty="0">
-                                    <a:solidFill>
-                                      <a:schemeClr val="accent4"/>
-                                    </a:solidFill>
-                                    <a:latin typeface="Cambria Math" panose="02040503050406030204" pitchFamily="18" charset="0"/>
-                                  </a:rPr>
-                                  <m:t>𝑥</m:t>
-                                </m:r>
-                              </m:e>
-                              <m:sub>
-                                <m:r>
-                                  <a:rPr lang="en-GB" sz="2800" i="1" dirty="0">
-                                    <a:solidFill>
-                                      <a:schemeClr val="accent4"/>
-                                    </a:solidFill>
-                                    <a:latin typeface="Cambria Math" panose="02040503050406030204" pitchFamily="18" charset="0"/>
-                                  </a:rPr>
-                                  <m:t>𝑎</m:t>
-                                </m:r>
-                              </m:sub>
-                            </m:sSub>
-                          </m:den>
-                        </m:f>
-                      </m:oMath>
-                    </m:oMathPara>
-                  </a14:m>
-                  <a:endParaRPr lang="en-GB" sz="2800" dirty="0">
-                    <a:solidFill>
-                      <a:schemeClr val="accent4"/>
-                    </a:solidFill>
-                  </a:endParaRPr>
-                </a:p>
-              </p:txBody>
-            </p:sp>
-          </mc:Choice>
-          <mc:Fallback xmlns="">
-            <p:sp>
-              <p:nvSpPr>
-                <p:cNvPr id="50" name="TextBox 49">
-                  <a:extLst>
-                    <a:ext uri="{FF2B5EF4-FFF2-40B4-BE49-F238E27FC236}">
-                      <a16:creationId xmlns:a16="http://schemas.microsoft.com/office/drawing/2014/main" id="{5A78ABC9-7BC2-464B-BD6A-BA255E299A87}"/>
-                    </a:ext>
-                  </a:extLst>
-                </p:cNvPr>
-                <p:cNvSpPr txBox="1">
-                  <a:spLocks noRot="1" noChangeAspect="1" noMove="1" noResize="1" noEditPoints="1" noAdjustHandles="1" noChangeArrowheads="1" noChangeShapeType="1" noTextEdit="1"/>
-                </p:cNvSpPr>
-                <p:nvPr/>
-              </p:nvSpPr>
-              <p:spPr>
-                <a:xfrm>
-                  <a:off x="606311" y="1407765"/>
-                  <a:ext cx="2771976" cy="902876"/>
-                </a:xfrm>
-                <a:prstGeom prst="rect">
-                  <a:avLst/>
-                </a:prstGeom>
-                <a:blipFill>
-                  <a:blip r:embed="rId12"/>
-                  <a:stretch>
-                    <a:fillRect/>
-                  </a:stretch>
-                </a:blipFill>
-              </p:spPr>
-              <p:txBody>
-                <a:bodyPr/>
-                <a:lstStyle/>
-                <a:p>
-                  <a:r>
-                    <a:rPr lang="en-GB">
-                      <a:noFill/>
-                    </a:rPr>
-                    <a:t> </a:t>
-                  </a:r>
-                </a:p>
-              </p:txBody>
-            </p:sp>
-          </mc:Fallback>
-        </mc:AlternateContent>
-      </p:grpSp>
+        </mc:Choice>
+        <mc:Fallback xmlns="">
+          <p:sp>
+            <p:nvSpPr>
+              <p:cNvPr id="50" name="TextBox 49">
+                <a:extLst>
+                  <a:ext uri="{FF2B5EF4-FFF2-40B4-BE49-F238E27FC236}">
+                    <a16:creationId xmlns:a16="http://schemas.microsoft.com/office/drawing/2014/main" id="{5A78ABC9-7BC2-464B-BD6A-BA255E299A87}"/>
+                  </a:ext>
+                </a:extLst>
+              </p:cNvPr>
+              <p:cNvSpPr txBox="1">
+                <a:spLocks noRot="1" noChangeAspect="1" noMove="1" noResize="1" noEditPoints="1" noAdjustHandles="1" noChangeArrowheads="1" noChangeShapeType="1" noTextEdit="1"/>
+              </p:cNvSpPr>
+              <p:nvPr/>
+            </p:nvSpPr>
+            <p:spPr>
+              <a:xfrm>
+                <a:off x="606311" y="1407765"/>
+                <a:ext cx="2771976" cy="902876"/>
+              </a:xfrm>
+              <a:prstGeom prst="rect">
+                <a:avLst/>
+              </a:prstGeom>
+              <a:blipFill>
+                <a:blip r:embed="rId15"/>
+                <a:stretch>
+                  <a:fillRect/>
+                </a:stretch>
+              </a:blipFill>
+            </p:spPr>
+            <p:txBody>
+              <a:bodyPr/>
+              <a:lstStyle/>
+              <a:p>
+                <a:r>
+                  <a:rPr lang="en-GB">
+                    <a:noFill/>
+                  </a:rPr>
+                  <a:t> </a:t>
+                </a:r>
+              </a:p>
+            </p:txBody>
+          </p:sp>
+        </mc:Fallback>
+      </mc:AlternateContent>
       <mc:AlternateContent xmlns:mc="http://schemas.openxmlformats.org/markup-compatibility/2006" xmlns:a14="http://schemas.microsoft.com/office/drawing/2010/main">
         <mc:Choice Requires="a14">
           <p:sp>
@@ -11633,7 +11544,7 @@
                 <a:avLst/>
               </a:prstGeom>
               <a:blipFill>
-                <a:blip r:embed="rId13"/>
+                <a:blip r:embed="rId16"/>
                 <a:stretch>
                   <a:fillRect/>
                 </a:stretch>
@@ -11655,6 +11566,9 @@
         </mc:Fallback>
       </mc:AlternateContent>
     </p:spTree>
+    <p:custDataLst>
+      <p:tags r:id="rId1"/>
+    </p:custDataLst>
     <p:extLst>
       <p:ext uri="{BB962C8B-B14F-4D97-AF65-F5344CB8AC3E}">
         <p14:creationId xmlns:p14="http://schemas.microsoft.com/office/powerpoint/2010/main" val="4107587269"/>
@@ -11664,14 +11578,14 @@
   <p:clrMapOvr>
     <a:masterClrMapping/>
   </p:clrMapOvr>
-  <mc:AlternateContent xmlns:mc="http://schemas.openxmlformats.org/markup-compatibility/2006">
-    <mc:Choice xmlns:p14="http://schemas.microsoft.com/office/powerpoint/2010/main" Requires="p14">
-      <p:transition spd="med" p14:dur="700">
+  <mc:AlternateContent xmlns:mc="http://schemas.openxmlformats.org/markup-compatibility/2006" xmlns:p14="http://schemas.microsoft.com/office/powerpoint/2010/main">
+    <mc:Choice Requires="p14">
+      <p:transition spd="med" p14:dur="700" advTm="58087">
         <p:fade/>
       </p:transition>
     </mc:Choice>
-    <mc:Fallback>
-      <p:transition spd="med">
+    <mc:Fallback xmlns="">
+      <p:transition spd="med" advTm="58087">
         <p:fade/>
       </p:transition>
     </mc:Fallback>
@@ -11697,7 +11611,7 @@
                             </p:stCondLst>
                             <p:childTnLst>
                               <p:par>
-                                <p:cTn id="5" presetID="10" presetClass="entr" presetSubtype="0" fill="hold" nodeType="clickEffect">
+                                <p:cTn id="5" presetID="10" presetClass="entr" presetSubtype="0" fill="hold" grpId="0" nodeType="clickEffect">
                                   <p:stCondLst>
                                     <p:cond delay="0"/>
                                   </p:stCondLst>
@@ -11710,7 +11624,7 @@
                                           </p:stCondLst>
                                         </p:cTn>
                                         <p:tgtEl>
-                                          <p:spTgt spid="3"/>
+                                          <p:spTgt spid="35"/>
                                         </p:tgtEl>
                                         <p:attrNameLst>
                                           <p:attrName>style.visibility</p:attrName>
@@ -11724,7 +11638,7 @@
                                       <p:cBhvr>
                                         <p:cTn id="7" dur="500"/>
                                         <p:tgtEl>
-                                          <p:spTgt spid="3"/>
+                                          <p:spTgt spid="35"/>
                                         </p:tgtEl>
                                       </p:cBhvr>
                                     </p:animEffect>
@@ -11750,7 +11664,7 @@
                             </p:stCondLst>
                             <p:childTnLst>
                               <p:par>
-                                <p:cTn id="10" presetID="10" presetClass="entr" presetSubtype="0" fill="hold" grpId="0" nodeType="clickEffect">
+                                <p:cTn id="10" presetID="10" presetClass="entr" presetSubtype="0" fill="hold" nodeType="clickEffect">
                                   <p:stCondLst>
                                     <p:cond delay="0"/>
                                   </p:stCondLst>
@@ -11763,7 +11677,7 @@
                                           </p:stCondLst>
                                         </p:cTn>
                                         <p:tgtEl>
-                                          <p:spTgt spid="51"/>
+                                          <p:spTgt spid="47"/>
                                         </p:tgtEl>
                                         <p:attrNameLst>
                                           <p:attrName>style.visibility</p:attrName>
@@ -11777,7 +11691,7 @@
                                       <p:cBhvr>
                                         <p:cTn id="12" dur="500"/>
                                         <p:tgtEl>
-                                          <p:spTgt spid="51"/>
+                                          <p:spTgt spid="47"/>
                                         </p:tgtEl>
                                       </p:cBhvr>
                                     </p:animEffect>
@@ -11816,7 +11730,7 @@
                                           </p:stCondLst>
                                         </p:cTn>
                                         <p:tgtEl>
-                                          <p:spTgt spid="35"/>
+                                          <p:spTgt spid="50"/>
                                         </p:tgtEl>
                                         <p:attrNameLst>
                                           <p:attrName>style.visibility</p:attrName>
@@ -11830,7 +11744,60 @@
                                       <p:cBhvr>
                                         <p:cTn id="17" dur="500"/>
                                         <p:tgtEl>
-                                          <p:spTgt spid="35"/>
+                                          <p:spTgt spid="50"/>
+                                        </p:tgtEl>
+                                      </p:cBhvr>
+                                    </p:animEffect>
+                                  </p:childTnLst>
+                                </p:cTn>
+                              </p:par>
+                            </p:childTnLst>
+                          </p:cTn>
+                        </p:par>
+                      </p:childTnLst>
+                    </p:cTn>
+                  </p:par>
+                  <p:par>
+                    <p:cTn id="18" fill="hold">
+                      <p:stCondLst>
+                        <p:cond delay="indefinite"/>
+                      </p:stCondLst>
+                      <p:childTnLst>
+                        <p:par>
+                          <p:cTn id="19" fill="hold">
+                            <p:stCondLst>
+                              <p:cond delay="0"/>
+                            </p:stCondLst>
+                            <p:childTnLst>
+                              <p:par>
+                                <p:cTn id="20" presetID="10" presetClass="entr" presetSubtype="0" fill="hold" grpId="0" nodeType="clickEffect">
+                                  <p:stCondLst>
+                                    <p:cond delay="0"/>
+                                  </p:stCondLst>
+                                  <p:childTnLst>
+                                    <p:set>
+                                      <p:cBhvr>
+                                        <p:cTn id="21" dur="1" fill="hold">
+                                          <p:stCondLst>
+                                            <p:cond delay="0"/>
+                                          </p:stCondLst>
+                                        </p:cTn>
+                                        <p:tgtEl>
+                                          <p:spTgt spid="51"/>
+                                        </p:tgtEl>
+                                        <p:attrNameLst>
+                                          <p:attrName>style.visibility</p:attrName>
+                                        </p:attrNameLst>
+                                      </p:cBhvr>
+                                      <p:to>
+                                        <p:strVal val="visible"/>
+                                      </p:to>
+                                    </p:set>
+                                    <p:animEffect transition="in" filter="fade">
+                                      <p:cBhvr>
+                                        <p:cTn id="22" dur="500"/>
+                                        <p:tgtEl>
+                                          <p:spTgt spid="51"/>
                                         </p:tgtEl>
                                       </p:cBhvr>
                                     </p:animEffect>
@@ -11866,6 +11833,7 @@
     </p:tnLst>
     <p:bldLst>
       <p:bldP spid="35" grpId="0"/>
+      <p:bldP spid="50" grpId="0"/>
       <p:bldP spid="51" grpId="0"/>
     </p:bldLst>
   </p:timing>
@@ -12265,7 +12233,7 @@
                   <a:avLst/>
                 </a:prstGeom>
                 <a:blipFill>
-                  <a:blip r:embed="rId3"/>
+                  <a:blip r:embed="rId6"/>
                   <a:stretch>
                     <a:fillRect/>
                   </a:stretch>
@@ -12459,7 +12427,7 @@
                   <a:avLst/>
                 </a:prstGeom>
                 <a:blipFill>
-                  <a:blip r:embed="rId4"/>
+                  <a:blip r:embed="rId7"/>
                   <a:stretch>
                     <a:fillRect/>
                   </a:stretch>
@@ -12678,7 +12646,7 @@
                   <a:avLst/>
                 </a:prstGeom>
                 <a:blipFill>
-                  <a:blip r:embed="rId5"/>
+                  <a:blip r:embed="rId8"/>
                   <a:stretch>
                     <a:fillRect/>
                   </a:stretch>
@@ -12791,7 +12759,7 @@
                   <a:avLst/>
                 </a:prstGeom>
                 <a:blipFill>
-                  <a:blip r:embed="rId6"/>
+                  <a:blip r:embed="rId9"/>
                   <a:stretch>
                     <a:fillRect/>
                   </a:stretch>
@@ -13084,7 +13052,7 @@
                     <a:avLst/>
                   </a:prstGeom>
                   <a:blipFill>
-                    <a:blip r:embed="rId7"/>
+                    <a:blip r:embed="rId10"/>
                     <a:stretch>
                       <a:fillRect/>
                     </a:stretch>
@@ -13282,7 +13250,7 @@
                     <a:avLst/>
                   </a:prstGeom>
                   <a:blipFill>
-                    <a:blip r:embed="rId8"/>
+                    <a:blip r:embed="rId11"/>
                     <a:stretch>
                       <a:fillRect/>
                     </a:stretch>
@@ -13585,7 +13553,7 @@
                   <a:avLst/>
                 </a:prstGeom>
                 <a:blipFill>
-                  <a:blip r:embed="rId9"/>
+                  <a:blip r:embed="rId12"/>
                   <a:stretch>
                     <a:fillRect/>
                   </a:stretch>
@@ -13829,7 +13797,7 @@
                   <a:avLst/>
                 </a:prstGeom>
                 <a:blipFill>
-                  <a:blip r:embed="rId10"/>
+                  <a:blip r:embed="rId13"/>
                   <a:stretch>
                     <a:fillRect/>
                   </a:stretch>
@@ -14585,7 +14553,7 @@
                 <a:avLst/>
               </a:prstGeom>
               <a:blipFill>
-                <a:blip r:embed="rId11"/>
+                <a:blip r:embed="rId14"/>
                 <a:stretch>
                   <a:fillRect/>
                 </a:stretch>
@@ -15432,7 +15400,7 @@
                   <a:avLst/>
                 </a:prstGeom>
                 <a:blipFill>
-                  <a:blip r:embed="rId12"/>
+                  <a:blip r:embed="rId15"/>
                   <a:stretch>
                     <a:fillRect/>
                   </a:stretch>
@@ -15455,6 +15423,9 @@
         </mc:AlternateContent>
       </p:grpSp>
     </p:spTree>
+    <p:custDataLst>
+      <p:tags r:id="rId1"/>
+    </p:custDataLst>
     <p:extLst>
       <p:ext uri="{BB962C8B-B14F-4D97-AF65-F5344CB8AC3E}">
         <p14:creationId xmlns:p14="http://schemas.microsoft.com/office/powerpoint/2010/main" val="1471731691"/>
@@ -15464,14 +15435,14 @@
   <p:clrMapOvr>
     <a:masterClrMapping/>
   </p:clrMapOvr>
-  <mc:AlternateContent xmlns:mc="http://schemas.openxmlformats.org/markup-compatibility/2006">
-    <mc:Choice xmlns:p14="http://schemas.microsoft.com/office/powerpoint/2010/main" Requires="p14">
-      <p:transition spd="med" p14:dur="700">
+  <mc:AlternateContent xmlns:mc="http://schemas.openxmlformats.org/markup-compatibility/2006" xmlns:p14="http://schemas.microsoft.com/office/powerpoint/2010/main">
+    <mc:Choice Requires="p14">
+      <p:transition spd="med" p14:dur="700" advTm="33968">
         <p:fade/>
       </p:transition>
     </mc:Choice>
-    <mc:Fallback>
-      <p:transition spd="med">
+    <mc:Fallback xmlns="">
+      <p:transition spd="med" advTm="33968">
         <p:fade/>
       </p:transition>
     </mc:Fallback>
@@ -15724,12 +15695,12 @@
   </p:clrMapOvr>
   <mc:AlternateContent xmlns:mc="http://schemas.openxmlformats.org/markup-compatibility/2006" xmlns:p14="http://schemas.microsoft.com/office/powerpoint/2010/main">
     <mc:Choice Requires="p14">
-      <p:transition spd="med" p14:dur="700">
+      <p:transition spd="med" p14:dur="700" advTm="19683">
         <p:fade/>
       </p:transition>
     </mc:Choice>
     <mc:Fallback xmlns="">
-      <p:transition spd="med">
+      <p:transition spd="med" advTm="19683">
         <p:fade/>
       </p:transition>
     </mc:Fallback>
@@ -15778,7 +15749,7 @@
                 </a:r>
                 <a:r>
                   <a:rPr lang="en-US" sz="2800" b="1" dirty="0">
-                    <a:hlinkClick r:id="rId3"/>
+                    <a:hlinkClick r:id="rId4"/>
                   </a:rPr>
                   <a:t>point</a:t>
                 </a:r>
@@ -15948,7 +15919,7 @@
                 </a:r>
                 <a:r>
                   <a:rPr lang="en-US" sz="2800" b="1" dirty="0">
-                    <a:hlinkClick r:id="rId4"/>
+                    <a:hlinkClick r:id="rId5"/>
                   </a:rPr>
                   <a:t>coordinates</a:t>
                 </a:r>
@@ -15991,7 +15962,7 @@
             </p:nvSpPr>
             <p:spPr>
               <a:blipFill>
-                <a:blip r:embed="rId5"/>
+                <a:blip r:embed="rId8"/>
                 <a:stretch>
                   <a:fillRect l="-294" t="-1467" r="-1294"/>
                 </a:stretch>
@@ -16195,7 +16166,7 @@
                     <a:avLst/>
                   </a:prstGeom>
                   <a:blipFill>
-                    <a:blip r:embed="rId6"/>
+                    <a:blip r:embed="rId9"/>
                     <a:stretch>
                       <a:fillRect/>
                     </a:stretch>
@@ -16415,7 +16386,7 @@
                       <a:avLst/>
                     </a:prstGeom>
                     <a:blipFill>
-                      <a:blip r:embed="rId7"/>
+                      <a:blip r:embed="rId10"/>
                       <a:stretch>
                         <a:fillRect/>
                       </a:stretch>
@@ -16529,7 +16500,7 @@
                   <a:avLst/>
                 </a:prstGeom>
                 <a:blipFill>
-                  <a:blip r:embed="rId8"/>
+                  <a:blip r:embed="rId11"/>
                   <a:stretch>
                     <a:fillRect/>
                   </a:stretch>
@@ -16632,7 +16603,7 @@
                 <a:avLst/>
               </a:prstGeom>
               <a:blipFill>
-                <a:blip r:embed="rId9"/>
+                <a:blip r:embed="rId12"/>
                 <a:stretch>
                   <a:fillRect/>
                 </a:stretch>
@@ -16728,6 +16699,9 @@
         </p:txBody>
       </p:sp>
     </p:spTree>
+    <p:custDataLst>
+      <p:tags r:id="rId1"/>
+    </p:custDataLst>
     <p:extLst>
       <p:ext uri="{BB962C8B-B14F-4D97-AF65-F5344CB8AC3E}">
         <p14:creationId xmlns:p14="http://schemas.microsoft.com/office/powerpoint/2010/main" val="4149408345"/>
@@ -16739,12 +16713,12 @@
   </p:clrMapOvr>
   <mc:AlternateContent xmlns:mc="http://schemas.openxmlformats.org/markup-compatibility/2006" xmlns:p14="http://schemas.microsoft.com/office/powerpoint/2010/main">
     <mc:Choice Requires="p14">
-      <p:transition spd="med" p14:dur="700">
+      <p:transition spd="med" p14:dur="700" advTm="47800">
         <p:fade/>
       </p:transition>
     </mc:Choice>
     <mc:Fallback xmlns="">
-      <p:transition spd="med">
+      <p:transition spd="med" advTm="47800">
         <p:fade/>
       </p:transition>
     </mc:Fallback>
@@ -17900,7 +17874,7 @@
                 <a:avLst/>
               </a:prstGeom>
               <a:blipFill>
-                <a:blip r:embed="rId3"/>
+                <a:blip r:embed="rId6"/>
                 <a:stretch>
                   <a:fillRect/>
                 </a:stretch>
@@ -18018,7 +17992,7 @@
                 <a:avLst/>
               </a:prstGeom>
               <a:blipFill>
-                <a:blip r:embed="rId4"/>
+                <a:blip r:embed="rId7"/>
                 <a:stretch>
                   <a:fillRect/>
                 </a:stretch>
@@ -18136,7 +18110,7 @@
                 <a:avLst/>
               </a:prstGeom>
               <a:blipFill>
-                <a:blip r:embed="rId5"/>
+                <a:blip r:embed="rId8"/>
                 <a:stretch>
                   <a:fillRect/>
                 </a:stretch>
@@ -18254,7 +18228,7 @@
                 <a:avLst/>
               </a:prstGeom>
               <a:blipFill>
-                <a:blip r:embed="rId6"/>
+                <a:blip r:embed="rId9"/>
                 <a:stretch>
                   <a:fillRect/>
                 </a:stretch>
@@ -18363,7 +18337,7 @@
                 <a:avLst/>
               </a:prstGeom>
               <a:blipFill>
-                <a:blip r:embed="rId7"/>
+                <a:blip r:embed="rId10"/>
                 <a:stretch>
                   <a:fillRect/>
                 </a:stretch>
@@ -18472,7 +18446,7 @@
                 <a:avLst/>
               </a:prstGeom>
               <a:blipFill>
-                <a:blip r:embed="rId8"/>
+                <a:blip r:embed="rId11"/>
                 <a:stretch>
                   <a:fillRect/>
                 </a:stretch>
@@ -18581,7 +18555,7 @@
                 <a:avLst/>
               </a:prstGeom>
               <a:blipFill>
-                <a:blip r:embed="rId9"/>
+                <a:blip r:embed="rId12"/>
                 <a:stretch>
                   <a:fillRect/>
                 </a:stretch>
@@ -18690,7 +18664,7 @@
                 <a:avLst/>
               </a:prstGeom>
               <a:blipFill>
-                <a:blip r:embed="rId10"/>
+                <a:blip r:embed="rId13"/>
                 <a:stretch>
                   <a:fillRect/>
                 </a:stretch>
@@ -19014,7 +18988,7 @@
                 <a:avLst/>
               </a:prstGeom>
               <a:blipFill>
-                <a:blip r:embed="rId11"/>
+                <a:blip r:embed="rId14"/>
                 <a:stretch>
                   <a:fillRect/>
                 </a:stretch>
@@ -19123,7 +19097,7 @@
                 <a:avLst/>
               </a:prstGeom>
               <a:blipFill>
-                <a:blip r:embed="rId12"/>
+                <a:blip r:embed="rId15"/>
                 <a:stretch>
                   <a:fillRect/>
                 </a:stretch>
@@ -19232,7 +19206,7 @@
                 <a:avLst/>
               </a:prstGeom>
               <a:blipFill>
-                <a:blip r:embed="rId13"/>
+                <a:blip r:embed="rId16"/>
                 <a:stretch>
                   <a:fillRect/>
                 </a:stretch>
@@ -19350,7 +19324,7 @@
                 <a:avLst/>
               </a:prstGeom>
               <a:blipFill>
-                <a:blip r:embed="rId14"/>
+                <a:blip r:embed="rId17"/>
                 <a:stretch>
                   <a:fillRect/>
                 </a:stretch>
@@ -19468,7 +19442,7 @@
                 <a:avLst/>
               </a:prstGeom>
               <a:blipFill>
-                <a:blip r:embed="rId15"/>
+                <a:blip r:embed="rId18"/>
                 <a:stretch>
                   <a:fillRect/>
                 </a:stretch>
@@ -19597,7 +19571,7 @@
                   <a:avLst/>
                 </a:prstGeom>
                 <a:blipFill>
-                  <a:blip r:embed="rId16"/>
+                  <a:blip r:embed="rId19"/>
                   <a:stretch>
                     <a:fillRect/>
                   </a:stretch>
@@ -19709,7 +19683,7 @@
                   <a:avLst/>
                 </a:prstGeom>
                 <a:blipFill>
-                  <a:blip r:embed="rId17"/>
+                  <a:blip r:embed="rId20"/>
                   <a:stretch>
                     <a:fillRect/>
                   </a:stretch>
@@ -19821,7 +19795,7 @@
                   <a:avLst/>
                 </a:prstGeom>
                 <a:blipFill>
-                  <a:blip r:embed="rId18"/>
+                  <a:blip r:embed="rId21"/>
                   <a:stretch>
                     <a:fillRect/>
                   </a:stretch>
@@ -19933,7 +19907,7 @@
                   <a:avLst/>
                 </a:prstGeom>
                 <a:blipFill>
-                  <a:blip r:embed="rId19"/>
+                  <a:blip r:embed="rId22"/>
                   <a:stretch>
                     <a:fillRect/>
                   </a:stretch>
@@ -20045,7 +20019,7 @@
                   <a:avLst/>
                 </a:prstGeom>
                 <a:blipFill>
-                  <a:blip r:embed="rId20"/>
+                  <a:blip r:embed="rId23"/>
                   <a:stretch>
                     <a:fillRect/>
                   </a:stretch>
@@ -20353,7 +20327,7 @@
                 <a:avLst/>
               </a:prstGeom>
               <a:blipFill>
-                <a:blip r:embed="rId21"/>
+                <a:blip r:embed="rId24"/>
                 <a:stretch>
                   <a:fillRect/>
                 </a:stretch>
@@ -20449,7 +20423,7 @@
                 <a:avLst/>
               </a:prstGeom>
               <a:blipFill>
-                <a:blip r:embed="rId22"/>
+                <a:blip r:embed="rId25"/>
                 <a:stretch>
                   <a:fillRect/>
                 </a:stretch>
@@ -20654,7 +20628,7 @@
                 <a:avLst/>
               </a:prstGeom>
               <a:blipFill>
-                <a:blip r:embed="rId23"/>
+                <a:blip r:embed="rId26"/>
                 <a:stretch>
                   <a:fillRect/>
                 </a:stretch>
@@ -20676,6 +20650,9 @@
         </mc:Fallback>
       </mc:AlternateContent>
     </p:spTree>
+    <p:custDataLst>
+      <p:tags r:id="rId1"/>
+    </p:custDataLst>
     <p:extLst>
       <p:ext uri="{BB962C8B-B14F-4D97-AF65-F5344CB8AC3E}">
         <p14:creationId xmlns:p14="http://schemas.microsoft.com/office/powerpoint/2010/main" val="1941986029"/>
@@ -20687,12 +20664,12 @@
   </p:clrMapOvr>
   <mc:AlternateContent xmlns:mc="http://schemas.openxmlformats.org/markup-compatibility/2006" xmlns:p14="http://schemas.microsoft.com/office/powerpoint/2010/main">
     <mc:Choice Requires="p14">
-      <p:transition spd="med" p14:dur="700">
+      <p:transition spd="med" p14:dur="700" advTm="41042">
         <p:fade/>
       </p:transition>
     </mc:Choice>
     <mc:Fallback xmlns="">
-      <p:transition spd="med">
+      <p:transition spd="med" advTm="41042">
         <p:fade/>
       </p:transition>
     </mc:Fallback>
@@ -21151,7 +21128,7 @@
                   <a:avLst/>
                 </a:prstGeom>
                 <a:blipFill>
-                  <a:blip r:embed="rId3"/>
+                  <a:blip r:embed="rId6"/>
                   <a:stretch>
                     <a:fillRect/>
                   </a:stretch>
@@ -21345,7 +21322,7 @@
                   <a:avLst/>
                 </a:prstGeom>
                 <a:blipFill>
-                  <a:blip r:embed="rId4"/>
+                  <a:blip r:embed="rId7"/>
                   <a:stretch>
                     <a:fillRect/>
                   </a:stretch>
@@ -21394,7 +21371,7 @@
             </a:r>
             <a:r>
               <a:rPr lang="en-GB" sz="2800" b="1" dirty="0">
-                <a:hlinkClick r:id="rId5"/>
+                <a:hlinkClick r:id="rId8"/>
               </a:rPr>
               <a:t>line</a:t>
             </a:r>
@@ -21638,7 +21615,7 @@
                   <a:avLst/>
                 </a:prstGeom>
                 <a:blipFill>
-                  <a:blip r:embed="rId6"/>
+                  <a:blip r:embed="rId9"/>
                   <a:stretch>
                     <a:fillRect/>
                   </a:stretch>
@@ -21661,6 +21638,9 @@
         </mc:AlternateContent>
       </p:grpSp>
     </p:spTree>
+    <p:custDataLst>
+      <p:tags r:id="rId1"/>
+    </p:custDataLst>
     <p:extLst>
       <p:ext uri="{BB962C8B-B14F-4D97-AF65-F5344CB8AC3E}">
         <p14:creationId xmlns:p14="http://schemas.microsoft.com/office/powerpoint/2010/main" val="44778180"/>
@@ -21672,12 +21652,12 @@
   </p:clrMapOvr>
   <mc:AlternateContent xmlns:mc="http://schemas.openxmlformats.org/markup-compatibility/2006" xmlns:p14="http://schemas.microsoft.com/office/powerpoint/2010/main">
     <mc:Choice Requires="p14">
-      <p:transition spd="med" p14:dur="700">
+      <p:transition spd="med" p14:dur="700" advTm="41281">
         <p:fade/>
       </p:transition>
     </mc:Choice>
     <mc:Fallback xmlns="">
-      <p:transition spd="med">
+      <p:transition spd="med" advTm="41281">
         <p:fade/>
       </p:transition>
     </mc:Fallback>
@@ -22079,7 +22059,7 @@
             </a:r>
             <a:r>
               <a:rPr lang="en-GB" b="1" dirty="0">
-                <a:hlinkClick r:id="rId3"/>
+                <a:hlinkClick r:id="rId4"/>
               </a:rPr>
               <a:t>triangle</a:t>
             </a:r>
@@ -22615,7 +22595,7 @@
                     <a:avLst/>
                   </a:prstGeom>
                   <a:blipFill>
-                    <a:blip r:embed="rId4"/>
+                    <a:blip r:embed="rId7"/>
                     <a:stretch>
                       <a:fillRect/>
                     </a:stretch>
@@ -22809,7 +22789,7 @@
                     <a:avLst/>
                   </a:prstGeom>
                   <a:blipFill>
-                    <a:blip r:embed="rId5"/>
+                    <a:blip r:embed="rId8"/>
                     <a:stretch>
                       <a:fillRect/>
                     </a:stretch>
@@ -23003,7 +22983,7 @@
                     <a:avLst/>
                   </a:prstGeom>
                   <a:blipFill>
-                    <a:blip r:embed="rId6"/>
+                    <a:blip r:embed="rId9"/>
                     <a:stretch>
                       <a:fillRect/>
                     </a:stretch>
@@ -23493,6 +23473,9 @@
         </p:sp>
       </p:grpSp>
     </p:spTree>
+    <p:custDataLst>
+      <p:tags r:id="rId1"/>
+    </p:custDataLst>
     <p:extLst>
       <p:ext uri="{BB962C8B-B14F-4D97-AF65-F5344CB8AC3E}">
         <p14:creationId xmlns:p14="http://schemas.microsoft.com/office/powerpoint/2010/main" val="3220539911"/>
@@ -23504,12 +23487,12 @@
   </p:clrMapOvr>
   <mc:AlternateContent xmlns:mc="http://schemas.openxmlformats.org/markup-compatibility/2006" xmlns:p14="http://schemas.microsoft.com/office/powerpoint/2010/main">
     <mc:Choice Requires="p14">
-      <p:transition spd="med" p14:dur="700">
+      <p:transition spd="med" p14:dur="700" advTm="39847">
         <p:fade/>
       </p:transition>
     </mc:Choice>
     <mc:Fallback xmlns="">
-      <p:transition spd="med">
+      <p:transition spd="med" advTm="39847">
         <p:fade/>
       </p:transition>
     </mc:Fallback>
@@ -24345,7 +24328,7 @@
                       <a:avLst/>
                     </a:prstGeom>
                     <a:blipFill>
-                      <a:blip r:embed="rId3"/>
+                      <a:blip r:embed="rId6"/>
                       <a:stretch>
                         <a:fillRect/>
                       </a:stretch>
@@ -24444,7 +24427,7 @@
                       <a:avLst/>
                     </a:prstGeom>
                     <a:blipFill>
-                      <a:blip r:embed="rId4"/>
+                      <a:blip r:embed="rId7"/>
                       <a:stretch>
                         <a:fillRect/>
                       </a:stretch>
@@ -24543,7 +24526,7 @@
                       <a:avLst/>
                     </a:prstGeom>
                     <a:blipFill>
-                      <a:blip r:embed="rId5"/>
+                      <a:blip r:embed="rId8"/>
                       <a:stretch>
                         <a:fillRect/>
                       </a:stretch>
@@ -24597,7 +24580,7 @@
               <a:p>
                 <a:r>
                   <a:rPr lang="en-GB" b="1" dirty="0">
-                    <a:hlinkClick r:id="rId6"/>
+                    <a:hlinkClick r:id="rId9"/>
                   </a:rPr>
                   <a:t>Pythagorean Theorem</a:t>
                 </a:r>
@@ -24829,7 +24812,7 @@
                 </a:br>
                 <a:r>
                   <a:rPr lang="en-GB" sz="2000" dirty="0">
-                    <a:hlinkClick r:id="rId7"/>
+                    <a:hlinkClick r:id="rId10"/>
                   </a:rPr>
                   <a:t>www.youtube.com/watch?v=ANR4g0lPrEQ</a:t>
                 </a:r>
@@ -24861,7 +24844,7 @@
                 <a:ext cx="5118099" cy="5188740"/>
               </a:xfrm>
               <a:blipFill>
-                <a:blip r:embed="rId8"/>
+                <a:blip r:embed="rId11"/>
                 <a:stretch>
                   <a:fillRect l="-1429" t="-1528"/>
                 </a:stretch>
@@ -24960,7 +24943,7 @@
                 <a:avLst/>
               </a:prstGeom>
               <a:blipFill>
-                <a:blip r:embed="rId9"/>
+                <a:blip r:embed="rId12"/>
                 <a:stretch>
                   <a:fillRect/>
                 </a:stretch>
@@ -25059,7 +25042,7 @@
                 <a:avLst/>
               </a:prstGeom>
               <a:blipFill>
-                <a:blip r:embed="rId10"/>
+                <a:blip r:embed="rId13"/>
                 <a:stretch>
                   <a:fillRect/>
                 </a:stretch>
@@ -25158,7 +25141,7 @@
                 <a:avLst/>
               </a:prstGeom>
               <a:blipFill>
-                <a:blip r:embed="rId11"/>
+                <a:blip r:embed="rId14"/>
                 <a:stretch>
                   <a:fillRect/>
                 </a:stretch>
@@ -25251,7 +25234,7 @@
                 <a:solidFill>
                   <a:schemeClr val="accent2"/>
                 </a:solidFill>
-                <a:hlinkClick r:id="rId12">
+                <a:hlinkClick r:id="rId15">
                   <a:extLst>
                     <a:ext uri="{A12FA001-AC4F-418D-AE19-62706E023703}">
                       <ahyp:hlinkClr xmlns:ahyp="http://schemas.microsoft.com/office/drawing/2018/hyperlinkcolor" val="tx"/>
@@ -25336,6 +25319,9 @@
         </p:txBody>
       </p:sp>
     </p:spTree>
+    <p:custDataLst>
+      <p:tags r:id="rId1"/>
+    </p:custDataLst>
     <p:extLst>
       <p:ext uri="{BB962C8B-B14F-4D97-AF65-F5344CB8AC3E}">
         <p14:creationId xmlns:p14="http://schemas.microsoft.com/office/powerpoint/2010/main" val="2092374292"/>
@@ -25347,12 +25333,12 @@
   </p:clrMapOvr>
   <mc:AlternateContent xmlns:mc="http://schemas.openxmlformats.org/markup-compatibility/2006" xmlns:p14="http://schemas.microsoft.com/office/powerpoint/2010/main">
     <mc:Choice Requires="p14">
-      <p:transition spd="med" p14:dur="700">
+      <p:transition spd="med" p14:dur="700" advTm="91874">
         <p:fade/>
       </p:transition>
     </mc:Choice>
     <mc:Fallback xmlns="">
-      <p:transition spd="med">
+      <p:transition spd="med" advTm="91874">
         <p:fade/>
       </p:transition>
     </mc:Fallback>
@@ -25505,11 +25491,7 @@
                                           </p:stCondLst>
                                         </p:cTn>
                                         <p:tgtEl>
-                                          <p:spTgt spid="19">
-                                            <p:txEl>
-                                              <p:pRg st="1" end="1"/>
-                                            </p:txEl>
-                                          </p:spTgt>
+                                          <p:spTgt spid="24"/>
                                         </p:tgtEl>
                                         <p:attrNameLst>
                                           <p:attrName>style.visibility</p:attrName>
@@ -25523,11 +25505,7 @@
                                       <p:cBhvr>
                                         <p:cTn id="17" dur="500"/>
                                         <p:tgtEl>
-                                          <p:spTgt spid="19">
-                                            <p:txEl>
-                                              <p:pRg st="1" end="1"/>
-                                            </p:txEl>
-                                          </p:spTgt>
+                                          <p:spTgt spid="24"/>
                                         </p:tgtEl>
                                       </p:cBhvr>
                                     </p:animEffect>
@@ -25566,7 +25544,11 @@
                                           </p:stCondLst>
                                         </p:cTn>
                                         <p:tgtEl>
-                                          <p:spTgt spid="24"/>
+                                          <p:spTgt spid="19">
+                                            <p:txEl>
+                                              <p:pRg st="1" end="1"/>
+                                            </p:txEl>
+                                          </p:spTgt>
                                         </p:tgtEl>
                                         <p:attrNameLst>
                                           <p:attrName>style.visibility</p:attrName>
@@ -25580,7 +25562,11 @@
                                       <p:cBhvr>
                                         <p:cTn id="22" dur="500"/>
                                         <p:tgtEl>
-                                          <p:spTgt spid="24"/>
+                                          <p:spTgt spid="19">
+                                            <p:txEl>
+                                              <p:pRg st="1" end="1"/>
+                                            </p:txEl>
+                                          </p:spTgt>
                                         </p:tgtEl>
                                       </p:cBhvr>
                                     </p:animEffect>
@@ -26297,7 +26283,7 @@
                   <a:avLst/>
                 </a:prstGeom>
                 <a:blipFill>
-                  <a:blip r:embed="rId3"/>
+                  <a:blip r:embed="rId7"/>
                   <a:stretch>
                     <a:fillRect/>
                   </a:stretch>
@@ -26396,7 +26382,7 @@
                   <a:avLst/>
                 </a:prstGeom>
                 <a:blipFill>
-                  <a:blip r:embed="rId4"/>
+                  <a:blip r:embed="rId8"/>
                   <a:stretch>
                     <a:fillRect/>
                   </a:stretch>
@@ -26499,7 +26485,7 @@
                   <a:avLst/>
                 </a:prstGeom>
                 <a:blipFill>
-                  <a:blip r:embed="rId5"/>
+                  <a:blip r:embed="rId9"/>
                   <a:stretch>
                     <a:fillRect/>
                   </a:stretch>
@@ -26956,7 +26942,7 @@
                 <a:avLst/>
               </a:prstGeom>
               <a:blipFill>
-                <a:blip r:embed="rId7"/>
+                <a:blip r:embed="rId10"/>
                 <a:stretch>
                   <a:fillRect/>
                 </a:stretch>
@@ -27089,6 +27075,9 @@
         </p:txBody>
       </p:sp>
     </p:spTree>
+    <p:custDataLst>
+      <p:tags r:id="rId1"/>
+    </p:custDataLst>
     <p:extLst>
       <p:ext uri="{BB962C8B-B14F-4D97-AF65-F5344CB8AC3E}">
         <p14:creationId xmlns:p14="http://schemas.microsoft.com/office/powerpoint/2010/main" val="3116124235"/>
@@ -27100,12 +27089,12 @@
   </p:clrMapOvr>
   <mc:AlternateContent xmlns:mc="http://schemas.openxmlformats.org/markup-compatibility/2006" xmlns:p14="http://schemas.microsoft.com/office/powerpoint/2010/main">
     <mc:Choice Requires="p14">
-      <p:transition spd="med" p14:dur="700">
+      <p:transition spd="med" p14:dur="700" advTm="82466">
         <p:fade/>
       </p:transition>
     </mc:Choice>
     <mc:Fallback xmlns="">
-      <p:transition spd="med">
+      <p:transition spd="med" advTm="82466">
         <p:fade/>
       </p:transition>
     </mc:Fallback>
@@ -27636,17 +27625,77 @@
   </p:clrMapOvr>
   <mc:AlternateContent xmlns:mc="http://schemas.openxmlformats.org/markup-compatibility/2006" xmlns:p14="http://schemas.microsoft.com/office/powerpoint/2010/main">
     <mc:Choice Requires="p14">
-      <p:transition spd="med" p14:dur="700">
+      <p:transition spd="med" p14:dur="700" advTm="81567">
         <p:fade/>
       </p:transition>
     </mc:Choice>
     <mc:Fallback xmlns="">
-      <p:transition spd="med">
+      <p:transition spd="med" advTm="81567">
         <p:fade/>
       </p:transition>
     </mc:Fallback>
   </mc:AlternateContent>
 </p:sld>
+</file>
+
+<file path=ppt/tags/tag1.xml><?xml version="1.0" encoding="utf-8"?>
+<p:tagLst xmlns:a="http://schemas.openxmlformats.org/drawingml/2006/main" xmlns:r="http://schemas.openxmlformats.org/officeDocument/2006/relationships" xmlns:p="http://schemas.openxmlformats.org/presentationml/2006/main">
+  <p:tag name="TIMING" val="|12.6|11.3|10.3|2.7|4.4"/>
+</p:tagLst>
+</file>
+
+<file path=ppt/tags/tag10.xml><?xml version="1.0" encoding="utf-8"?>
+<p:tagLst xmlns:a="http://schemas.openxmlformats.org/drawingml/2006/main" xmlns:r="http://schemas.openxmlformats.org/officeDocument/2006/relationships" xmlns:p="http://schemas.openxmlformats.org/presentationml/2006/main">
+  <p:tag name="TIMING" val="|8.1|8"/>
+</p:tagLst>
+</file>
+
+<file path=ppt/tags/tag2.xml><?xml version="1.0" encoding="utf-8"?>
+<p:tagLst xmlns:a="http://schemas.openxmlformats.org/drawingml/2006/main" xmlns:r="http://schemas.openxmlformats.org/officeDocument/2006/relationships" xmlns:p="http://schemas.openxmlformats.org/presentationml/2006/main">
+  <p:tag name="TIMING" val="|14.1"/>
+</p:tagLst>
+</file>
+
+<file path=ppt/tags/tag3.xml><?xml version="1.0" encoding="utf-8"?>
+<p:tagLst xmlns:a="http://schemas.openxmlformats.org/drawingml/2006/main" xmlns:r="http://schemas.openxmlformats.org/officeDocument/2006/relationships" xmlns:p="http://schemas.openxmlformats.org/presentationml/2006/main">
+  <p:tag name="TIMING" val="|5.1|10.9|5.1|6.4|5.6"/>
+</p:tagLst>
+</file>
+
+<file path=ppt/tags/tag4.xml><?xml version="1.0" encoding="utf-8"?>
+<p:tagLst xmlns:a="http://schemas.openxmlformats.org/drawingml/2006/main" xmlns:r="http://schemas.openxmlformats.org/officeDocument/2006/relationships" xmlns:p="http://schemas.openxmlformats.org/presentationml/2006/main">
+  <p:tag name="TIMING" val="|3.5|2.5|11.7|5|4.9|4.5"/>
+</p:tagLst>
+</file>
+
+<file path=ppt/tags/tag5.xml><?xml version="1.0" encoding="utf-8"?>
+<p:tagLst xmlns:a="http://schemas.openxmlformats.org/drawingml/2006/main" xmlns:r="http://schemas.openxmlformats.org/officeDocument/2006/relationships" xmlns:p="http://schemas.openxmlformats.org/presentationml/2006/main">
+  <p:tag name="TIMING" val="|10.4|10.9|3.2|23|23.1"/>
+</p:tagLst>
+</file>
+
+<file path=ppt/tags/tag6.xml><?xml version="1.0" encoding="utf-8"?>
+<p:tagLst xmlns:a="http://schemas.openxmlformats.org/drawingml/2006/main" xmlns:r="http://schemas.openxmlformats.org/officeDocument/2006/relationships" xmlns:p="http://schemas.openxmlformats.org/presentationml/2006/main">
+  <p:tag name="TIMING" val="|7.3|4|11.7|27.4|12.3|4.2"/>
+</p:tagLst>
+</file>
+
+<file path=ppt/tags/tag7.xml><?xml version="1.0" encoding="utf-8"?>
+<p:tagLst xmlns:a="http://schemas.openxmlformats.org/drawingml/2006/main" xmlns:r="http://schemas.openxmlformats.org/officeDocument/2006/relationships" xmlns:p="http://schemas.openxmlformats.org/presentationml/2006/main">
+  <p:tag name="TIMING" val="|17.9|21.6|6.7"/>
+</p:tagLst>
+</file>
+
+<file path=ppt/tags/tag8.xml><?xml version="1.0" encoding="utf-8"?>
+<p:tagLst xmlns:a="http://schemas.openxmlformats.org/drawingml/2006/main" xmlns:r="http://schemas.openxmlformats.org/officeDocument/2006/relationships" xmlns:p="http://schemas.openxmlformats.org/presentationml/2006/main">
+  <p:tag name="TIMING" val="|6.4|6.4|3.8|12.1|15.3|6.6"/>
+</p:tagLst>
+</file>
+
+<file path=ppt/tags/tag9.xml><?xml version="1.0" encoding="utf-8"?>
+<p:tagLst xmlns:a="http://schemas.openxmlformats.org/drawingml/2006/main" xmlns:r="http://schemas.openxmlformats.org/officeDocument/2006/relationships" xmlns:p="http://schemas.openxmlformats.org/presentationml/2006/main">
+  <p:tag name="TIMING" val="|15.1|3.5|12.5|10.4"/>
+</p:tagLst>
 </file>
 
 <file path=ppt/theme/theme1.xml><?xml version="1.0" encoding="utf-8"?>

</xml_diff>